<commit_message>
commit changes for ppt for my slides relating the razor syntax
</commit_message>
<xml_diff>
--- a/Razor views.pptx
+++ b/Razor views.pptx
@@ -12,10 +12,16 @@
     <p:sldId id="260" r:id="rId6"/>
     <p:sldId id="263" r:id="rId7"/>
     <p:sldId id="264" r:id="rId8"/>
-    <p:sldId id="261" r:id="rId9"/>
-    <p:sldId id="258" r:id="rId10"/>
-    <p:sldId id="266" r:id="rId11"/>
-    <p:sldId id="265" r:id="rId12"/>
+    <p:sldId id="272" r:id="rId9"/>
+    <p:sldId id="271" r:id="rId10"/>
+    <p:sldId id="273" r:id="rId11"/>
+    <p:sldId id="274" r:id="rId12"/>
+    <p:sldId id="267" r:id="rId13"/>
+    <p:sldId id="268" r:id="rId14"/>
+    <p:sldId id="261" r:id="rId15"/>
+    <p:sldId id="269" r:id="rId16"/>
+    <p:sldId id="266" r:id="rId17"/>
+    <p:sldId id="265" r:id="rId18"/>
   </p:sldIdLst>
   <p:sldSz cx="12192000" cy="6858000"/>
   <p:notesSz cx="6858000" cy="9144000"/>
@@ -844,7 +850,7 @@
           <a:p>
             <a:fld id="{0FEE1455-314D-4A91-9865-DAED05F0825E}" type="datetimeFigureOut">
               <a:rPr lang="en-US" smtClean="0"/>
-              <a:t>3/18/2019</a:t>
+              <a:t>3/19/2019</a:t>
             </a:fld>
             <a:endParaRPr lang="en-US"/>
           </a:p>
@@ -1095,7 +1101,7 @@
           <a:p>
             <a:fld id="{0FEE1455-314D-4A91-9865-DAED05F0825E}" type="datetimeFigureOut">
               <a:rPr lang="en-US" smtClean="0"/>
-              <a:t>3/18/2019</a:t>
+              <a:t>3/19/2019</a:t>
             </a:fld>
             <a:endParaRPr lang="en-US"/>
           </a:p>
@@ -1409,7 +1415,7 @@
           <a:p>
             <a:fld id="{0FEE1455-314D-4A91-9865-DAED05F0825E}" type="datetimeFigureOut">
               <a:rPr lang="en-US" smtClean="0"/>
-              <a:t>3/18/2019</a:t>
+              <a:t>3/19/2019</a:t>
             </a:fld>
             <a:endParaRPr lang="en-US"/>
           </a:p>
@@ -1750,7 +1756,7 @@
           <a:p>
             <a:fld id="{0FEE1455-314D-4A91-9865-DAED05F0825E}" type="datetimeFigureOut">
               <a:rPr lang="en-US" smtClean="0"/>
-              <a:t>3/18/2019</a:t>
+              <a:t>3/19/2019</a:t>
             </a:fld>
             <a:endParaRPr lang="en-US"/>
           </a:p>
@@ -2064,7 +2070,7 @@
           <a:p>
             <a:fld id="{0FEE1455-314D-4A91-9865-DAED05F0825E}" type="datetimeFigureOut">
               <a:rPr lang="en-US" smtClean="0"/>
-              <a:t>3/18/2019</a:t>
+              <a:t>3/19/2019</a:t>
             </a:fld>
             <a:endParaRPr lang="en-US"/>
           </a:p>
@@ -2457,7 +2463,7 @@
           <a:p>
             <a:fld id="{0FEE1455-314D-4A91-9865-DAED05F0825E}" type="datetimeFigureOut">
               <a:rPr lang="en-US" smtClean="0"/>
-              <a:t>3/18/2019</a:t>
+              <a:t>3/19/2019</a:t>
             </a:fld>
             <a:endParaRPr lang="en-US"/>
           </a:p>
@@ -2627,7 +2633,7 @@
           <a:p>
             <a:fld id="{0FEE1455-314D-4A91-9865-DAED05F0825E}" type="datetimeFigureOut">
               <a:rPr lang="en-US" smtClean="0"/>
-              <a:t>3/18/2019</a:t>
+              <a:t>3/19/2019</a:t>
             </a:fld>
             <a:endParaRPr lang="en-US"/>
           </a:p>
@@ -2807,7 +2813,7 @@
           <a:p>
             <a:fld id="{0FEE1455-314D-4A91-9865-DAED05F0825E}" type="datetimeFigureOut">
               <a:rPr lang="en-US" smtClean="0"/>
-              <a:t>3/18/2019</a:t>
+              <a:t>3/19/2019</a:t>
             </a:fld>
             <a:endParaRPr lang="en-US"/>
           </a:p>
@@ -2983,7 +2989,7 @@
           <a:p>
             <a:fld id="{0FEE1455-314D-4A91-9865-DAED05F0825E}" type="datetimeFigureOut">
               <a:rPr lang="en-US" smtClean="0"/>
-              <a:t>3/18/2019</a:t>
+              <a:t>3/19/2019</a:t>
             </a:fld>
             <a:endParaRPr lang="en-US"/>
           </a:p>
@@ -3230,7 +3236,7 @@
           <a:p>
             <a:fld id="{0FEE1455-314D-4A91-9865-DAED05F0825E}" type="datetimeFigureOut">
               <a:rPr lang="en-US" smtClean="0"/>
-              <a:t>3/18/2019</a:t>
+              <a:t>3/19/2019</a:t>
             </a:fld>
             <a:endParaRPr lang="en-US"/>
           </a:p>
@@ -3462,7 +3468,7 @@
           <a:p>
             <a:fld id="{0FEE1455-314D-4A91-9865-DAED05F0825E}" type="datetimeFigureOut">
               <a:rPr lang="en-US" smtClean="0"/>
-              <a:t>3/18/2019</a:t>
+              <a:t>3/19/2019</a:t>
             </a:fld>
             <a:endParaRPr lang="en-US"/>
           </a:p>
@@ -3836,7 +3842,7 @@
           <a:p>
             <a:fld id="{0FEE1455-314D-4A91-9865-DAED05F0825E}" type="datetimeFigureOut">
               <a:rPr lang="en-US" smtClean="0"/>
-              <a:t>3/18/2019</a:t>
+              <a:t>3/19/2019</a:t>
             </a:fld>
             <a:endParaRPr lang="en-US"/>
           </a:p>
@@ -3959,7 +3965,7 @@
           <a:p>
             <a:fld id="{0FEE1455-314D-4A91-9865-DAED05F0825E}" type="datetimeFigureOut">
               <a:rPr lang="en-US" smtClean="0"/>
-              <a:t>3/18/2019</a:t>
+              <a:t>3/19/2019</a:t>
             </a:fld>
             <a:endParaRPr lang="en-US"/>
           </a:p>
@@ -4054,7 +4060,7 @@
           <a:p>
             <a:fld id="{0FEE1455-314D-4A91-9865-DAED05F0825E}" type="datetimeFigureOut">
               <a:rPr lang="en-US" smtClean="0"/>
-              <a:t>3/18/2019</a:t>
+              <a:t>3/19/2019</a:t>
             </a:fld>
             <a:endParaRPr lang="en-US"/>
           </a:p>
@@ -4309,7 +4315,7 @@
           <a:p>
             <a:fld id="{0FEE1455-314D-4A91-9865-DAED05F0825E}" type="datetimeFigureOut">
               <a:rPr lang="en-US" smtClean="0"/>
-              <a:t>3/18/2019</a:t>
+              <a:t>3/19/2019</a:t>
             </a:fld>
             <a:endParaRPr lang="en-US"/>
           </a:p>
@@ -4572,7 +4578,7 @@
           <a:p>
             <a:fld id="{0FEE1455-314D-4A91-9865-DAED05F0825E}" type="datetimeFigureOut">
               <a:rPr lang="en-US" smtClean="0"/>
-              <a:t>3/18/2019</a:t>
+              <a:t>3/19/2019</a:t>
             </a:fld>
             <a:endParaRPr lang="en-US"/>
           </a:p>
@@ -5315,7 +5321,7 @@
           <a:p>
             <a:fld id="{0FEE1455-314D-4A91-9865-DAED05F0825E}" type="datetimeFigureOut">
               <a:rPr lang="en-US" smtClean="0"/>
-              <a:t>3/18/2019</a:t>
+              <a:t>3/19/2019</a:t>
             </a:fld>
             <a:endParaRPr lang="en-US"/>
           </a:p>
@@ -5856,8 +5862,8 @@
         </p:nvSpPr>
         <p:spPr>
           <a:xfrm>
-            <a:off x="1115182" y="902305"/>
-            <a:ext cx="7766936" cy="1646302"/>
+            <a:off x="1115181" y="902305"/>
+            <a:ext cx="8015371" cy="1477824"/>
           </a:xfrm>
         </p:spPr>
         <p:txBody>
@@ -5902,8 +5908,8 @@
         </p:nvSpPr>
         <p:spPr>
           <a:xfrm>
-            <a:off x="632178" y="2981032"/>
-            <a:ext cx="9550400" cy="2908503"/>
+            <a:off x="632177" y="2796988"/>
+            <a:ext cx="9560693" cy="3092547"/>
           </a:xfrm>
         </p:spPr>
         <p:txBody>
@@ -5936,11 +5942,8 @@
                 <a:latin typeface="Cambria" panose="02040503050406030204" pitchFamily="18" charset="0"/>
                 <a:ea typeface="Cambria" panose="02040503050406030204" pitchFamily="18" charset="0"/>
               </a:rPr>
-              <a:t>Members:</a:t>
-            </a:r>
-          </a:p>
-          <a:p>
-            <a:pPr algn="l"/>
+              <a:t>Members</a:t>
+            </a:r>
             <a:r>
               <a:rPr lang="en-US" sz="2400" dirty="0" smtClean="0">
                 <a:solidFill>
@@ -5952,10 +5955,23 @@
                 <a:latin typeface="Cambria" panose="02040503050406030204" pitchFamily="18" charset="0"/>
                 <a:ea typeface="Cambria" panose="02040503050406030204" pitchFamily="18" charset="0"/>
               </a:rPr>
-              <a:t>Harika Naidu			</a:t>
-            </a:r>
-            <a:r>
-              <a:rPr lang="en-US" sz="2400" dirty="0">
+              <a:t>:</a:t>
+            </a:r>
+            <a:endParaRPr lang="en-US" sz="2400" dirty="0" smtClean="0">
+              <a:solidFill>
+                <a:schemeClr val="tx1">
+                  <a:lumMod val="95000"/>
+                  <a:lumOff val="5000"/>
+                </a:schemeClr>
+              </a:solidFill>
+              <a:latin typeface="Cambria" panose="02040503050406030204" pitchFamily="18" charset="0"/>
+              <a:ea typeface="Cambria" panose="02040503050406030204" pitchFamily="18" charset="0"/>
+            </a:endParaRPr>
+          </a:p>
+          <a:p>
+            <a:pPr algn="l"/>
+            <a:r>
+              <a:rPr lang="en-US" sz="2400" dirty="0" smtClean="0">
                 <a:solidFill>
                   <a:schemeClr val="tx1">
                     <a:lumMod val="95000"/>
@@ -5965,10 +5981,10 @@
                 <a:latin typeface="Cambria" panose="02040503050406030204" pitchFamily="18" charset="0"/>
                 <a:ea typeface="Cambria" panose="02040503050406030204" pitchFamily="18" charset="0"/>
               </a:rPr>
-              <a:t>Sai </a:t>
-            </a:r>
-            <a:r>
-              <a:rPr lang="en-US" sz="2400" dirty="0" err="1">
+              <a:t>Harika Naidu			</a:t>
+            </a:r>
+            <a:r>
+              <a:rPr lang="en-US" sz="2400" dirty="0">
                 <a:solidFill>
                   <a:schemeClr val="tx1">
                     <a:lumMod val="95000"/>
@@ -5978,10 +5994,10 @@
                 <a:latin typeface="Cambria" panose="02040503050406030204" pitchFamily="18" charset="0"/>
                 <a:ea typeface="Cambria" panose="02040503050406030204" pitchFamily="18" charset="0"/>
               </a:rPr>
-              <a:t>Tejaswini</a:t>
-            </a:r>
-            <a:r>
-              <a:rPr lang="en-US" sz="2400" dirty="0">
+              <a:t>Sai Tejaswini </a:t>
+            </a:r>
+            <a:r>
+              <a:rPr lang="en-US" sz="2400" dirty="0" smtClean="0">
                 <a:solidFill>
                   <a:schemeClr val="tx1">
                     <a:lumMod val="95000"/>
@@ -5991,33 +6007,7 @@
                 <a:latin typeface="Cambria" panose="02040503050406030204" pitchFamily="18" charset="0"/>
                 <a:ea typeface="Cambria" panose="02040503050406030204" pitchFamily="18" charset="0"/>
               </a:rPr>
-              <a:t> </a:t>
-            </a:r>
-            <a:r>
-              <a:rPr lang="en-US" sz="2400" dirty="0" err="1" smtClean="0">
-                <a:solidFill>
-                  <a:schemeClr val="tx1">
-                    <a:lumMod val="95000"/>
-                    <a:lumOff val="5000"/>
-                  </a:schemeClr>
-                </a:solidFill>
-                <a:latin typeface="Cambria" panose="02040503050406030204" pitchFamily="18" charset="0"/>
-                <a:ea typeface="Cambria" panose="02040503050406030204" pitchFamily="18" charset="0"/>
-              </a:rPr>
-              <a:t>Narne</a:t>
-            </a:r>
-            <a:r>
-              <a:rPr lang="en-US" sz="2400" dirty="0" smtClean="0">
-                <a:solidFill>
-                  <a:schemeClr val="tx1">
-                    <a:lumMod val="95000"/>
-                    <a:lumOff val="5000"/>
-                  </a:schemeClr>
-                </a:solidFill>
-                <a:latin typeface="Cambria" panose="02040503050406030204" pitchFamily="18" charset="0"/>
-                <a:ea typeface="Cambria" panose="02040503050406030204" pitchFamily="18" charset="0"/>
-              </a:rPr>
-              <a:t>			</a:t>
+              <a:t>Narne			</a:t>
             </a:r>
             <a:r>
               <a:rPr lang="en-US" sz="2400" dirty="0" err="1" smtClean="0">
@@ -6124,6 +6114,36 @@
           <a:xfrm>
             <a:off x="632178" y="4039402"/>
             <a:ext cx="1727201" cy="1850133"/>
+          </a:xfrm>
+          <a:prstGeom prst="rect">
+            <a:avLst/>
+          </a:prstGeom>
+        </p:spPr>
+      </p:pic>
+      <p:pic>
+        <p:nvPicPr>
+          <p:cNvPr id="5" name="Picture 4"/>
+          <p:cNvPicPr>
+            <a:picLocks noChangeAspect="1"/>
+          </p:cNvPicPr>
+          <p:nvPr/>
+        </p:nvPicPr>
+        <p:blipFill>
+          <a:blip r:embed="rId3">
+            <a:extLst>
+              <a:ext uri="{28A0092B-C50C-407E-A947-70E740481C1C}">
+                <a14:useLocalDpi xmlns:a14="http://schemas.microsoft.com/office/drawing/2010/main" val="0"/>
+              </a:ext>
+            </a:extLst>
+          </a:blip>
+          <a:stretch>
+            <a:fillRect/>
+          </a:stretch>
+        </p:blipFill>
+        <p:spPr>
+          <a:xfrm>
+            <a:off x="3866029" y="4011968"/>
+            <a:ext cx="1905000" cy="1905000"/>
           </a:xfrm>
           <a:prstGeom prst="rect">
             <a:avLst/>
@@ -6172,6 +6192,1494 @@
         </p:nvSpPr>
         <p:spPr>
           <a:xfrm>
+            <a:off x="809896" y="627017"/>
+            <a:ext cx="8464105" cy="927463"/>
+          </a:xfrm>
+        </p:spPr>
+        <p:txBody>
+          <a:bodyPr/>
+          <a:lstStyle/>
+          <a:p>
+            <a:r>
+              <a:rPr lang="en-US" dirty="0" smtClean="0"/>
+              <a:t>Examples for the syntax</a:t>
+            </a:r>
+            <a:endParaRPr lang="en-US" dirty="0"/>
+          </a:p>
+        </p:txBody>
+      </p:sp>
+      <p:sp>
+        <p:nvSpPr>
+          <p:cNvPr id="3" name="Content Placeholder 2"/>
+          <p:cNvSpPr>
+            <a:spLocks noGrp="1"/>
+          </p:cNvSpPr>
+          <p:nvPr>
+            <p:ph idx="1"/>
+          </p:nvPr>
+        </p:nvSpPr>
+        <p:spPr>
+          <a:xfrm>
+            <a:off x="705394" y="1841864"/>
+            <a:ext cx="9196252" cy="3696788"/>
+          </a:xfrm>
+        </p:spPr>
+        <p:txBody>
+          <a:bodyPr>
+            <a:normAutofit/>
+          </a:bodyPr>
+          <a:lstStyle/>
+          <a:p>
+            <a:r>
+              <a:rPr lang="en-US" dirty="0">
+                <a:latin typeface="Times New Roman" panose="02020603050405020304" pitchFamily="18" charset="0"/>
+                <a:cs typeface="Times New Roman" panose="02020603050405020304" pitchFamily="18" charset="0"/>
+              </a:rPr>
+              <a:t>&lt;!-- Single statement block --&gt;</a:t>
+            </a:r>
+            <a:br>
+              <a:rPr lang="en-US" dirty="0">
+                <a:latin typeface="Times New Roman" panose="02020603050405020304" pitchFamily="18" charset="0"/>
+                <a:cs typeface="Times New Roman" panose="02020603050405020304" pitchFamily="18" charset="0"/>
+              </a:rPr>
+            </a:br>
+            <a:r>
+              <a:rPr lang="en-US" dirty="0">
+                <a:latin typeface="Times New Roman" panose="02020603050405020304" pitchFamily="18" charset="0"/>
+                <a:cs typeface="Times New Roman" panose="02020603050405020304" pitchFamily="18" charset="0"/>
+              </a:rPr>
+              <a:t>@{ var myMessage = "Hello World"; }</a:t>
+            </a:r>
+            <a:br>
+              <a:rPr lang="en-US" dirty="0">
+                <a:latin typeface="Times New Roman" panose="02020603050405020304" pitchFamily="18" charset="0"/>
+                <a:cs typeface="Times New Roman" panose="02020603050405020304" pitchFamily="18" charset="0"/>
+              </a:rPr>
+            </a:br>
+            <a:r>
+              <a:rPr lang="en-US" dirty="0">
+                <a:latin typeface="Times New Roman" panose="02020603050405020304" pitchFamily="18" charset="0"/>
+                <a:cs typeface="Times New Roman" panose="02020603050405020304" pitchFamily="18" charset="0"/>
+              </a:rPr>
+              <a:t/>
+            </a:r>
+            <a:br>
+              <a:rPr lang="en-US" dirty="0">
+                <a:latin typeface="Times New Roman" panose="02020603050405020304" pitchFamily="18" charset="0"/>
+                <a:cs typeface="Times New Roman" panose="02020603050405020304" pitchFamily="18" charset="0"/>
+              </a:rPr>
+            </a:br>
+            <a:r>
+              <a:rPr lang="en-US" dirty="0">
+                <a:latin typeface="Times New Roman" panose="02020603050405020304" pitchFamily="18" charset="0"/>
+                <a:cs typeface="Times New Roman" panose="02020603050405020304" pitchFamily="18" charset="0"/>
+              </a:rPr>
+              <a:t>&lt;!-- Inline expression or variable --&gt;</a:t>
+            </a:r>
+            <a:br>
+              <a:rPr lang="en-US" dirty="0">
+                <a:latin typeface="Times New Roman" panose="02020603050405020304" pitchFamily="18" charset="0"/>
+                <a:cs typeface="Times New Roman" panose="02020603050405020304" pitchFamily="18" charset="0"/>
+              </a:rPr>
+            </a:br>
+            <a:r>
+              <a:rPr lang="en-US" dirty="0">
+                <a:latin typeface="Times New Roman" panose="02020603050405020304" pitchFamily="18" charset="0"/>
+                <a:cs typeface="Times New Roman" panose="02020603050405020304" pitchFamily="18" charset="0"/>
+              </a:rPr>
+              <a:t>&lt;p&gt;The value of myMessage is: @myMessage&lt;/p&gt; </a:t>
+            </a:r>
+            <a:endParaRPr lang="en-US" dirty="0" smtClean="0">
+              <a:latin typeface="Times New Roman" panose="02020603050405020304" pitchFamily="18" charset="0"/>
+              <a:cs typeface="Times New Roman" panose="02020603050405020304" pitchFamily="18" charset="0"/>
+            </a:endParaRPr>
+          </a:p>
+          <a:p>
+            <a:endParaRPr lang="en-US" dirty="0">
+              <a:latin typeface="Times New Roman" panose="02020603050405020304" pitchFamily="18" charset="0"/>
+              <a:cs typeface="Times New Roman" panose="02020603050405020304" pitchFamily="18" charset="0"/>
+            </a:endParaRPr>
+          </a:p>
+          <a:p>
+            <a:r>
+              <a:rPr lang="en-US" dirty="0" smtClean="0">
+                <a:latin typeface="Times New Roman" panose="02020603050405020304" pitchFamily="18" charset="0"/>
+                <a:cs typeface="Times New Roman" panose="02020603050405020304" pitchFamily="18" charset="0"/>
+              </a:rPr>
+              <a:t>Output:</a:t>
+            </a:r>
+          </a:p>
+          <a:p>
+            <a:r>
+              <a:rPr lang="en-US" dirty="0">
+                <a:latin typeface="Times New Roman" panose="02020603050405020304" pitchFamily="18" charset="0"/>
+                <a:cs typeface="Times New Roman" panose="02020603050405020304" pitchFamily="18" charset="0"/>
+              </a:rPr>
+              <a:t>The value of myMessage is: Hello World</a:t>
+            </a:r>
+          </a:p>
+          <a:p>
+            <a:pPr marL="0" indent="0">
+              <a:buNone/>
+            </a:pPr>
+            <a:r>
+              <a:rPr lang="en-US" dirty="0">
+                <a:latin typeface="Times New Roman" panose="02020603050405020304" pitchFamily="18" charset="0"/>
+                <a:cs typeface="Times New Roman" panose="02020603050405020304" pitchFamily="18" charset="0"/>
+              </a:rPr>
+              <a:t/>
+            </a:r>
+            <a:br>
+              <a:rPr lang="en-US" dirty="0">
+                <a:latin typeface="Times New Roman" panose="02020603050405020304" pitchFamily="18" charset="0"/>
+                <a:cs typeface="Times New Roman" panose="02020603050405020304" pitchFamily="18" charset="0"/>
+              </a:rPr>
+            </a:br>
+            <a:r>
+              <a:rPr lang="en-US" dirty="0">
+                <a:latin typeface="Times New Roman" panose="02020603050405020304" pitchFamily="18" charset="0"/>
+                <a:cs typeface="Times New Roman" panose="02020603050405020304" pitchFamily="18" charset="0"/>
+              </a:rPr>
+              <a:t/>
+            </a:r>
+            <a:br>
+              <a:rPr lang="en-US" dirty="0">
+                <a:latin typeface="Times New Roman" panose="02020603050405020304" pitchFamily="18" charset="0"/>
+                <a:cs typeface="Times New Roman" panose="02020603050405020304" pitchFamily="18" charset="0"/>
+              </a:rPr>
+            </a:br>
+            <a:endParaRPr lang="en-US" dirty="0">
+              <a:latin typeface="Times New Roman" panose="02020603050405020304" pitchFamily="18" charset="0"/>
+              <a:cs typeface="Times New Roman" panose="02020603050405020304" pitchFamily="18" charset="0"/>
+            </a:endParaRPr>
+          </a:p>
+        </p:txBody>
+      </p:sp>
+      <p:sp>
+        <p:nvSpPr>
+          <p:cNvPr id="4" name="TextBox 3"/>
+          <p:cNvSpPr txBox="1"/>
+          <p:nvPr/>
+        </p:nvSpPr>
+        <p:spPr>
+          <a:xfrm>
+            <a:off x="7432765" y="5355770"/>
+            <a:ext cx="2272311" cy="367547"/>
+          </a:xfrm>
+          <a:prstGeom prst="rect">
+            <a:avLst/>
+          </a:prstGeom>
+          <a:noFill/>
+        </p:spPr>
+        <p:txBody>
+          <a:bodyPr wrap="square" rtlCol="0">
+            <a:spAutoFit/>
+          </a:bodyPr>
+          <a:lstStyle/>
+          <a:p>
+            <a:r>
+              <a:rPr lang="en-US" dirty="0">
+                <a:solidFill>
+                  <a:schemeClr val="tx1">
+                    <a:lumMod val="95000"/>
+                    <a:lumOff val="5000"/>
+                  </a:schemeClr>
+                </a:solidFill>
+                <a:latin typeface="Times New Roman" panose="02020603050405020304" pitchFamily="18" charset="0"/>
+                <a:ea typeface="Cambria" panose="02040503050406030204" pitchFamily="18" charset="0"/>
+                <a:cs typeface="Times New Roman" panose="02020603050405020304" pitchFamily="18" charset="0"/>
+              </a:rPr>
+              <a:t>Sai Tejaswini Narne</a:t>
+            </a:r>
+            <a:endParaRPr lang="en-US" dirty="0">
+              <a:latin typeface="Times New Roman" panose="02020603050405020304" pitchFamily="18" charset="0"/>
+              <a:cs typeface="Times New Roman" panose="02020603050405020304" pitchFamily="18" charset="0"/>
+            </a:endParaRPr>
+          </a:p>
+        </p:txBody>
+      </p:sp>
+    </p:spTree>
+    <p:extLst>
+      <p:ext uri="{BB962C8B-B14F-4D97-AF65-F5344CB8AC3E}">
+        <p14:creationId xmlns:p14="http://schemas.microsoft.com/office/powerpoint/2010/main" val="2095594394"/>
+      </p:ext>
+    </p:extLst>
+  </p:cSld>
+  <p:clrMapOvr>
+    <a:masterClrMapping/>
+  </p:clrMapOvr>
+  <p:timing>
+    <p:tnLst>
+      <p:par>
+        <p:cTn id="1" dur="indefinite" restart="never" nodeType="tmRoot"/>
+      </p:par>
+    </p:tnLst>
+  </p:timing>
+</p:sld>
+</file>
+
+<file path=ppt/slides/slide11.xml><?xml version="1.0" encoding="utf-8"?>
+<p:sld xmlns:a="http://schemas.openxmlformats.org/drawingml/2006/main" xmlns:r="http://schemas.openxmlformats.org/officeDocument/2006/relationships" xmlns:p="http://schemas.openxmlformats.org/presentationml/2006/main">
+  <p:cSld>
+    <p:spTree>
+      <p:nvGrpSpPr>
+        <p:cNvPr id="1" name=""/>
+        <p:cNvGrpSpPr/>
+        <p:nvPr/>
+      </p:nvGrpSpPr>
+      <p:grpSpPr>
+        <a:xfrm>
+          <a:off x="0" y="0"/>
+          <a:ext cx="0" cy="0"/>
+          <a:chOff x="0" y="0"/>
+          <a:chExt cx="0" cy="0"/>
+        </a:xfrm>
+      </p:grpSpPr>
+      <p:sp>
+        <p:nvSpPr>
+          <p:cNvPr id="2" name="Title 1"/>
+          <p:cNvSpPr>
+            <a:spLocks noGrp="1"/>
+          </p:cNvSpPr>
+          <p:nvPr>
+            <p:ph type="title"/>
+          </p:nvPr>
+        </p:nvSpPr>
+        <p:spPr>
+          <a:xfrm>
+            <a:off x="677334" y="666205"/>
+            <a:ext cx="8596668" cy="911497"/>
+          </a:xfrm>
+        </p:spPr>
+        <p:txBody>
+          <a:bodyPr/>
+          <a:lstStyle/>
+          <a:p>
+            <a:r>
+              <a:rPr lang="en-US" dirty="0" smtClean="0"/>
+              <a:t>Output of the Example</a:t>
+            </a:r>
+            <a:endParaRPr lang="en-US" dirty="0"/>
+          </a:p>
+        </p:txBody>
+      </p:sp>
+      <p:sp>
+        <p:nvSpPr>
+          <p:cNvPr id="3" name="Content Placeholder 2"/>
+          <p:cNvSpPr>
+            <a:spLocks noGrp="1"/>
+          </p:cNvSpPr>
+          <p:nvPr>
+            <p:ph idx="1"/>
+          </p:nvPr>
+        </p:nvSpPr>
+        <p:spPr>
+          <a:xfrm>
+            <a:off x="677334" y="1577702"/>
+            <a:ext cx="8596668" cy="3880773"/>
+          </a:xfrm>
+        </p:spPr>
+        <p:txBody>
+          <a:bodyPr/>
+          <a:lstStyle/>
+          <a:p>
+            <a:r>
+              <a:rPr lang="en-US" dirty="0" smtClean="0">
+                <a:latin typeface="Times New Roman" panose="02020603050405020304" pitchFamily="18" charset="0"/>
+                <a:cs typeface="Times New Roman" panose="02020603050405020304" pitchFamily="18" charset="0"/>
+              </a:rPr>
+              <a:t>&lt;!-- </a:t>
+            </a:r>
+            <a:r>
+              <a:rPr lang="en-US" dirty="0">
+                <a:latin typeface="Times New Roman" panose="02020603050405020304" pitchFamily="18" charset="0"/>
+                <a:cs typeface="Times New Roman" panose="02020603050405020304" pitchFamily="18" charset="0"/>
+              </a:rPr>
+              <a:t>Multi-statement block --&gt;</a:t>
+            </a:r>
+            <a:br>
+              <a:rPr lang="en-US" dirty="0">
+                <a:latin typeface="Times New Roman" panose="02020603050405020304" pitchFamily="18" charset="0"/>
+                <a:cs typeface="Times New Roman" panose="02020603050405020304" pitchFamily="18" charset="0"/>
+              </a:rPr>
+            </a:br>
+            <a:r>
+              <a:rPr lang="en-US" dirty="0">
+                <a:latin typeface="Times New Roman" panose="02020603050405020304" pitchFamily="18" charset="0"/>
+                <a:cs typeface="Times New Roman" panose="02020603050405020304" pitchFamily="18" charset="0"/>
+              </a:rPr>
+              <a:t>@{</a:t>
+            </a:r>
+            <a:br>
+              <a:rPr lang="en-US" dirty="0">
+                <a:latin typeface="Times New Roman" panose="02020603050405020304" pitchFamily="18" charset="0"/>
+                <a:cs typeface="Times New Roman" panose="02020603050405020304" pitchFamily="18" charset="0"/>
+              </a:rPr>
+            </a:br>
+            <a:r>
+              <a:rPr lang="en-US" dirty="0">
+                <a:latin typeface="Times New Roman" panose="02020603050405020304" pitchFamily="18" charset="0"/>
+                <a:cs typeface="Times New Roman" panose="02020603050405020304" pitchFamily="18" charset="0"/>
+              </a:rPr>
+              <a:t>var greeting = "Welcome to our site!";</a:t>
+            </a:r>
+            <a:br>
+              <a:rPr lang="en-US" dirty="0">
+                <a:latin typeface="Times New Roman" panose="02020603050405020304" pitchFamily="18" charset="0"/>
+                <a:cs typeface="Times New Roman" panose="02020603050405020304" pitchFamily="18" charset="0"/>
+              </a:rPr>
+            </a:br>
+            <a:r>
+              <a:rPr lang="en-US" dirty="0">
+                <a:latin typeface="Times New Roman" panose="02020603050405020304" pitchFamily="18" charset="0"/>
+                <a:cs typeface="Times New Roman" panose="02020603050405020304" pitchFamily="18" charset="0"/>
+              </a:rPr>
+              <a:t>var weekDay = DateTime.Now.DayOfWeek;</a:t>
+            </a:r>
+            <a:br>
+              <a:rPr lang="en-US" dirty="0">
+                <a:latin typeface="Times New Roman" panose="02020603050405020304" pitchFamily="18" charset="0"/>
+                <a:cs typeface="Times New Roman" panose="02020603050405020304" pitchFamily="18" charset="0"/>
+              </a:rPr>
+            </a:br>
+            <a:r>
+              <a:rPr lang="en-US" dirty="0">
+                <a:latin typeface="Times New Roman" panose="02020603050405020304" pitchFamily="18" charset="0"/>
+                <a:cs typeface="Times New Roman" panose="02020603050405020304" pitchFamily="18" charset="0"/>
+              </a:rPr>
+              <a:t>var greetingMessage = greeting + " Here in Maryville it is: " + weekDay;</a:t>
+            </a:r>
+            <a:br>
+              <a:rPr lang="en-US" dirty="0">
+                <a:latin typeface="Times New Roman" panose="02020603050405020304" pitchFamily="18" charset="0"/>
+                <a:cs typeface="Times New Roman" panose="02020603050405020304" pitchFamily="18" charset="0"/>
+              </a:rPr>
+            </a:br>
+            <a:r>
+              <a:rPr lang="en-US" dirty="0">
+                <a:latin typeface="Times New Roman" panose="02020603050405020304" pitchFamily="18" charset="0"/>
+                <a:cs typeface="Times New Roman" panose="02020603050405020304" pitchFamily="18" charset="0"/>
+              </a:rPr>
+              <a:t>}</a:t>
+            </a:r>
+            <a:br>
+              <a:rPr lang="en-US" dirty="0">
+                <a:latin typeface="Times New Roman" panose="02020603050405020304" pitchFamily="18" charset="0"/>
+                <a:cs typeface="Times New Roman" panose="02020603050405020304" pitchFamily="18" charset="0"/>
+              </a:rPr>
+            </a:br>
+            <a:r>
+              <a:rPr lang="en-US" dirty="0">
+                <a:latin typeface="Times New Roman" panose="02020603050405020304" pitchFamily="18" charset="0"/>
+                <a:cs typeface="Times New Roman" panose="02020603050405020304" pitchFamily="18" charset="0"/>
+              </a:rPr>
+              <a:t>&lt;p&gt;The greeting is: @greetingMessage&lt;/p</a:t>
+            </a:r>
+            <a:r>
+              <a:rPr lang="en-US" dirty="0" smtClean="0">
+                <a:latin typeface="Times New Roman" panose="02020603050405020304" pitchFamily="18" charset="0"/>
+                <a:cs typeface="Times New Roman" panose="02020603050405020304" pitchFamily="18" charset="0"/>
+              </a:rPr>
+              <a:t>&gt;</a:t>
+            </a:r>
+          </a:p>
+          <a:p>
+            <a:endParaRPr lang="en-US" dirty="0" smtClean="0">
+              <a:latin typeface="Times New Roman" panose="02020603050405020304" pitchFamily="18" charset="0"/>
+              <a:cs typeface="Times New Roman" panose="02020603050405020304" pitchFamily="18" charset="0"/>
+            </a:endParaRPr>
+          </a:p>
+          <a:p>
+            <a:r>
+              <a:rPr lang="en-US" dirty="0" smtClean="0">
+                <a:latin typeface="Times New Roman" panose="02020603050405020304" pitchFamily="18" charset="0"/>
+                <a:cs typeface="Times New Roman" panose="02020603050405020304" pitchFamily="18" charset="0"/>
+              </a:rPr>
+              <a:t>Output:</a:t>
+            </a:r>
+            <a:endParaRPr lang="en-US" dirty="0">
+              <a:latin typeface="Times New Roman" panose="02020603050405020304" pitchFamily="18" charset="0"/>
+              <a:cs typeface="Times New Roman" panose="02020603050405020304" pitchFamily="18" charset="0"/>
+            </a:endParaRPr>
+          </a:p>
+          <a:p>
+            <a:r>
+              <a:rPr lang="en-US" dirty="0">
+                <a:latin typeface="Times New Roman" panose="02020603050405020304" pitchFamily="18" charset="0"/>
+                <a:cs typeface="Times New Roman" panose="02020603050405020304" pitchFamily="18" charset="0"/>
+              </a:rPr>
+              <a:t>The greeting is: Welcome to our site! Here in Maryville it is: Tuesday</a:t>
+            </a:r>
+          </a:p>
+          <a:p>
+            <a:endParaRPr lang="en-US" dirty="0">
+              <a:latin typeface="Times New Roman" panose="02020603050405020304" pitchFamily="18" charset="0"/>
+              <a:cs typeface="Times New Roman" panose="02020603050405020304" pitchFamily="18" charset="0"/>
+            </a:endParaRPr>
+          </a:p>
+          <a:p>
+            <a:endParaRPr lang="en-US" dirty="0">
+              <a:latin typeface="Times New Roman" panose="02020603050405020304" pitchFamily="18" charset="0"/>
+              <a:cs typeface="Times New Roman" panose="02020603050405020304" pitchFamily="18" charset="0"/>
+            </a:endParaRPr>
+          </a:p>
+        </p:txBody>
+      </p:sp>
+      <p:sp>
+        <p:nvSpPr>
+          <p:cNvPr id="4" name="TextBox 3"/>
+          <p:cNvSpPr txBox="1"/>
+          <p:nvPr/>
+        </p:nvSpPr>
+        <p:spPr>
+          <a:xfrm>
+            <a:off x="7406641" y="5353986"/>
+            <a:ext cx="2298436" cy="369332"/>
+          </a:xfrm>
+          <a:prstGeom prst="rect">
+            <a:avLst/>
+          </a:prstGeom>
+          <a:noFill/>
+        </p:spPr>
+        <p:txBody>
+          <a:bodyPr wrap="square" rtlCol="0">
+            <a:spAutoFit/>
+          </a:bodyPr>
+          <a:lstStyle/>
+          <a:p>
+            <a:r>
+              <a:rPr lang="en-US" dirty="0">
+                <a:solidFill>
+                  <a:schemeClr val="tx1">
+                    <a:lumMod val="95000"/>
+                    <a:lumOff val="5000"/>
+                  </a:schemeClr>
+                </a:solidFill>
+                <a:latin typeface="Times New Roman" panose="02020603050405020304" pitchFamily="18" charset="0"/>
+                <a:ea typeface="Cambria" panose="02040503050406030204" pitchFamily="18" charset="0"/>
+                <a:cs typeface="Times New Roman" panose="02020603050405020304" pitchFamily="18" charset="0"/>
+              </a:rPr>
+              <a:t>Sai Tejaswini Narne</a:t>
+            </a:r>
+            <a:endParaRPr lang="en-US" dirty="0">
+              <a:latin typeface="Times New Roman" panose="02020603050405020304" pitchFamily="18" charset="0"/>
+              <a:cs typeface="Times New Roman" panose="02020603050405020304" pitchFamily="18" charset="0"/>
+            </a:endParaRPr>
+          </a:p>
+        </p:txBody>
+      </p:sp>
+    </p:spTree>
+    <p:extLst>
+      <p:ext uri="{BB962C8B-B14F-4D97-AF65-F5344CB8AC3E}">
+        <p14:creationId xmlns:p14="http://schemas.microsoft.com/office/powerpoint/2010/main" val="3486640118"/>
+      </p:ext>
+    </p:extLst>
+  </p:cSld>
+  <p:clrMapOvr>
+    <a:masterClrMapping/>
+  </p:clrMapOvr>
+  <p:timing>
+    <p:tnLst>
+      <p:par>
+        <p:cTn id="1" dur="indefinite" restart="never" nodeType="tmRoot"/>
+      </p:par>
+    </p:tnLst>
+  </p:timing>
+</p:sld>
+</file>
+
+<file path=ppt/slides/slide12.xml><?xml version="1.0" encoding="utf-8"?>
+<p:sld xmlns:a="http://schemas.openxmlformats.org/drawingml/2006/main" xmlns:r="http://schemas.openxmlformats.org/officeDocument/2006/relationships" xmlns:p="http://schemas.openxmlformats.org/presentationml/2006/main">
+  <p:cSld>
+    <p:spTree>
+      <p:nvGrpSpPr>
+        <p:cNvPr id="1" name=""/>
+        <p:cNvGrpSpPr/>
+        <p:nvPr/>
+      </p:nvGrpSpPr>
+      <p:grpSpPr>
+        <a:xfrm>
+          <a:off x="0" y="0"/>
+          <a:ext cx="0" cy="0"/>
+          <a:chOff x="0" y="0"/>
+          <a:chExt cx="0" cy="0"/>
+        </a:xfrm>
+      </p:grpSpPr>
+      <p:sp>
+        <p:nvSpPr>
+          <p:cNvPr id="3" name="Content Placeholder 2"/>
+          <p:cNvSpPr>
+            <a:spLocks noGrp="1"/>
+          </p:cNvSpPr>
+          <p:nvPr>
+            <p:ph idx="1"/>
+          </p:nvPr>
+        </p:nvSpPr>
+        <p:spPr>
+          <a:xfrm>
+            <a:off x="677334" y="1737893"/>
+            <a:ext cx="8596668" cy="4898038"/>
+          </a:xfrm>
+        </p:spPr>
+        <p:txBody>
+          <a:bodyPr>
+            <a:normAutofit/>
+          </a:bodyPr>
+          <a:lstStyle/>
+          <a:p>
+            <a:r>
+              <a:rPr lang="en-US" dirty="0" smtClean="0">
+                <a:latin typeface="Times New Roman" panose="02020603050405020304" pitchFamily="18" charset="0"/>
+                <a:cs typeface="Times New Roman" panose="02020603050405020304" pitchFamily="18" charset="0"/>
+              </a:rPr>
+              <a:t>Razor </a:t>
+            </a:r>
+            <a:r>
+              <a:rPr lang="en-US" dirty="0">
+                <a:latin typeface="Times New Roman" panose="02020603050405020304" pitchFamily="18" charset="0"/>
+                <a:cs typeface="Times New Roman" panose="02020603050405020304" pitchFamily="18" charset="0"/>
+              </a:rPr>
+              <a:t>is a markup syntax for embedding server-based code into </a:t>
+            </a:r>
+            <a:r>
+              <a:rPr lang="en-US" dirty="0" smtClean="0">
+                <a:latin typeface="Times New Roman" panose="02020603050405020304" pitchFamily="18" charset="0"/>
+                <a:cs typeface="Times New Roman" panose="02020603050405020304" pitchFamily="18" charset="0"/>
+              </a:rPr>
+              <a:t>webpages.</a:t>
+            </a:r>
+          </a:p>
+          <a:p>
+            <a:r>
+              <a:rPr lang="en-US" dirty="0" smtClean="0">
+                <a:latin typeface="Times New Roman" panose="02020603050405020304" pitchFamily="18" charset="0"/>
+                <a:cs typeface="Times New Roman" panose="02020603050405020304" pitchFamily="18" charset="0"/>
+              </a:rPr>
+              <a:t>The </a:t>
+            </a:r>
+            <a:r>
+              <a:rPr lang="en-US" dirty="0">
+                <a:latin typeface="Times New Roman" panose="02020603050405020304" pitchFamily="18" charset="0"/>
+                <a:cs typeface="Times New Roman" panose="02020603050405020304" pitchFamily="18" charset="0"/>
+              </a:rPr>
+              <a:t>Razor syntax consists of Razor markup, C#, and HTML. Files containing Razor generally have a </a:t>
+            </a:r>
+            <a:r>
+              <a:rPr lang="en-US" i="1" dirty="0">
+                <a:latin typeface="Times New Roman" panose="02020603050405020304" pitchFamily="18" charset="0"/>
+                <a:cs typeface="Times New Roman" panose="02020603050405020304" pitchFamily="18" charset="0"/>
+              </a:rPr>
+              <a:t>.</a:t>
+            </a:r>
+            <a:r>
+              <a:rPr lang="en-US" dirty="0">
+                <a:latin typeface="Times New Roman" panose="02020603050405020304" pitchFamily="18" charset="0"/>
+                <a:cs typeface="Times New Roman" panose="02020603050405020304" pitchFamily="18" charset="0"/>
+              </a:rPr>
+              <a:t>cshtml file extension</a:t>
+            </a:r>
+            <a:r>
+              <a:rPr lang="en-US" dirty="0" smtClean="0">
+                <a:latin typeface="Times New Roman" panose="02020603050405020304" pitchFamily="18" charset="0"/>
+                <a:cs typeface="Times New Roman" panose="02020603050405020304" pitchFamily="18" charset="0"/>
+              </a:rPr>
+              <a:t>.</a:t>
+            </a:r>
+          </a:p>
+          <a:p>
+            <a:r>
+              <a:rPr lang="en-US" dirty="0" smtClean="0">
+                <a:latin typeface="Times New Roman" panose="02020603050405020304" pitchFamily="18" charset="0"/>
+                <a:cs typeface="Times New Roman" panose="02020603050405020304" pitchFamily="18" charset="0"/>
+              </a:rPr>
+              <a:t>Razor web pages can be described as HTML pages with two kinds of content: HTML content and Razor code. </a:t>
+            </a:r>
+          </a:p>
+          <a:p>
+            <a:r>
+              <a:rPr lang="en-US" dirty="0" smtClean="0">
+                <a:latin typeface="Times New Roman" panose="02020603050405020304" pitchFamily="18" charset="0"/>
+                <a:cs typeface="Times New Roman" panose="02020603050405020304" pitchFamily="18" charset="0"/>
+              </a:rPr>
+              <a:t>Razor Syntax </a:t>
+            </a:r>
+            <a:r>
+              <a:rPr lang="en-US" dirty="0">
+                <a:latin typeface="Times New Roman" panose="02020603050405020304" pitchFamily="18" charset="0"/>
+                <a:cs typeface="Times New Roman" panose="02020603050405020304" pitchFamily="18" charset="0"/>
+              </a:rPr>
+              <a:t>is based on ASP.NET framework, the part of the Microsoft.NET Framework that’s specifically designed for creating web applications.</a:t>
+            </a:r>
+          </a:p>
+          <a:p>
+            <a:r>
+              <a:rPr lang="en-US" dirty="0">
+                <a:latin typeface="Times New Roman" panose="02020603050405020304" pitchFamily="18" charset="0"/>
+                <a:cs typeface="Times New Roman" panose="02020603050405020304" pitchFamily="18" charset="0"/>
+              </a:rPr>
+              <a:t>The Razor syntax gives you all the power of ASP.NET, but is using a simplified syntax that’s easier to learn if you’re a beginner, and makes you more productive if you’re an expert.</a:t>
+            </a:r>
+          </a:p>
+          <a:p>
+            <a:endParaRPr lang="en-US" dirty="0" smtClean="0">
+              <a:latin typeface="Times New Roman" panose="02020603050405020304" pitchFamily="18" charset="0"/>
+              <a:cs typeface="Times New Roman" panose="02020603050405020304" pitchFamily="18" charset="0"/>
+            </a:endParaRPr>
+          </a:p>
+        </p:txBody>
+      </p:sp>
+      <p:sp>
+        <p:nvSpPr>
+          <p:cNvPr id="5" name="Title 1"/>
+          <p:cNvSpPr>
+            <a:spLocks noGrp="1"/>
+          </p:cNvSpPr>
+          <p:nvPr>
+            <p:ph type="title"/>
+          </p:nvPr>
+        </p:nvSpPr>
+        <p:spPr>
+          <a:xfrm>
+            <a:off x="677334" y="770710"/>
+            <a:ext cx="8596668" cy="967182"/>
+          </a:xfrm>
+        </p:spPr>
+        <p:txBody>
+          <a:bodyPr/>
+          <a:lstStyle/>
+          <a:p>
+            <a:r>
+              <a:rPr lang="en-US" dirty="0" smtClean="0"/>
+              <a:t>Razor Syntax</a:t>
+            </a:r>
+            <a:endParaRPr lang="en-US" dirty="0"/>
+          </a:p>
+        </p:txBody>
+      </p:sp>
+      <p:sp>
+        <p:nvSpPr>
+          <p:cNvPr id="9" name="TextBox 8"/>
+          <p:cNvSpPr txBox="1"/>
+          <p:nvPr/>
+        </p:nvSpPr>
+        <p:spPr>
+          <a:xfrm>
+            <a:off x="7406641" y="5353986"/>
+            <a:ext cx="2298436" cy="369332"/>
+          </a:xfrm>
+          <a:prstGeom prst="rect">
+            <a:avLst/>
+          </a:prstGeom>
+          <a:noFill/>
+        </p:spPr>
+        <p:txBody>
+          <a:bodyPr wrap="square" rtlCol="0">
+            <a:spAutoFit/>
+          </a:bodyPr>
+          <a:lstStyle/>
+          <a:p>
+            <a:r>
+              <a:rPr lang="en-US" dirty="0">
+                <a:solidFill>
+                  <a:schemeClr val="tx1">
+                    <a:lumMod val="95000"/>
+                    <a:lumOff val="5000"/>
+                  </a:schemeClr>
+                </a:solidFill>
+                <a:latin typeface="Times New Roman" panose="02020603050405020304" pitchFamily="18" charset="0"/>
+                <a:ea typeface="Cambria" panose="02040503050406030204" pitchFamily="18" charset="0"/>
+                <a:cs typeface="Times New Roman" panose="02020603050405020304" pitchFamily="18" charset="0"/>
+              </a:rPr>
+              <a:t>Sai Tejaswini Narne</a:t>
+            </a:r>
+            <a:endParaRPr lang="en-US" dirty="0">
+              <a:latin typeface="Times New Roman" panose="02020603050405020304" pitchFamily="18" charset="0"/>
+              <a:cs typeface="Times New Roman" panose="02020603050405020304" pitchFamily="18" charset="0"/>
+            </a:endParaRPr>
+          </a:p>
+        </p:txBody>
+      </p:sp>
+    </p:spTree>
+    <p:extLst>
+      <p:ext uri="{BB962C8B-B14F-4D97-AF65-F5344CB8AC3E}">
+        <p14:creationId xmlns:p14="http://schemas.microsoft.com/office/powerpoint/2010/main" val="3302217392"/>
+      </p:ext>
+    </p:extLst>
+  </p:cSld>
+  <p:clrMapOvr>
+    <a:masterClrMapping/>
+  </p:clrMapOvr>
+  <p:timing>
+    <p:tnLst>
+      <p:par>
+        <p:cTn id="1" dur="indefinite" restart="never" nodeType="tmRoot"/>
+      </p:par>
+    </p:tnLst>
+  </p:timing>
+</p:sld>
+</file>
+
+<file path=ppt/slides/slide13.xml><?xml version="1.0" encoding="utf-8"?>
+<p:sld xmlns:a="http://schemas.openxmlformats.org/drawingml/2006/main" xmlns:r="http://schemas.openxmlformats.org/officeDocument/2006/relationships" xmlns:p="http://schemas.openxmlformats.org/presentationml/2006/main">
+  <p:cSld>
+    <p:spTree>
+      <p:nvGrpSpPr>
+        <p:cNvPr id="1" name=""/>
+        <p:cNvGrpSpPr/>
+        <p:nvPr/>
+      </p:nvGrpSpPr>
+      <p:grpSpPr>
+        <a:xfrm>
+          <a:off x="0" y="0"/>
+          <a:ext cx="0" cy="0"/>
+          <a:chOff x="0" y="0"/>
+          <a:chExt cx="0" cy="0"/>
+        </a:xfrm>
+      </p:grpSpPr>
+      <p:pic>
+        <p:nvPicPr>
+          <p:cNvPr id="2050" name="Picture 2" descr="Image result for razor syntax images"/>
+          <p:cNvPicPr>
+            <a:picLocks noChangeAspect="1" noChangeArrowheads="1"/>
+          </p:cNvPicPr>
+          <p:nvPr/>
+        </p:nvPicPr>
+        <p:blipFill>
+          <a:blip r:embed="rId2">
+            <a:extLst>
+              <a:ext uri="{28A0092B-C50C-407E-A947-70E740481C1C}">
+                <a14:useLocalDpi xmlns:a14="http://schemas.microsoft.com/office/drawing/2010/main" val="0"/>
+              </a:ext>
+            </a:extLst>
+          </a:blip>
+          <a:srcRect/>
+          <a:stretch>
+            <a:fillRect/>
+          </a:stretch>
+        </p:blipFill>
+        <p:spPr bwMode="auto">
+          <a:xfrm>
+            <a:off x="1828800" y="613955"/>
+            <a:ext cx="6660013" cy="4479042"/>
+          </a:xfrm>
+          <a:prstGeom prst="rect">
+            <a:avLst/>
+          </a:prstGeom>
+          <a:noFill/>
+          <a:extLst>
+            <a:ext uri="{909E8E84-426E-40DD-AFC4-6F175D3DCCD1}">
+              <a14:hiddenFill xmlns:a14="http://schemas.microsoft.com/office/drawing/2010/main">
+                <a:solidFill>
+                  <a:srgbClr val="FFFFFF"/>
+                </a:solidFill>
+              </a14:hiddenFill>
+            </a:ext>
+          </a:extLst>
+        </p:spPr>
+      </p:pic>
+      <p:sp>
+        <p:nvSpPr>
+          <p:cNvPr id="4" name="TextBox 3"/>
+          <p:cNvSpPr txBox="1"/>
+          <p:nvPr/>
+        </p:nvSpPr>
+        <p:spPr>
+          <a:xfrm>
+            <a:off x="7406641" y="5353986"/>
+            <a:ext cx="2298436" cy="369332"/>
+          </a:xfrm>
+          <a:prstGeom prst="rect">
+            <a:avLst/>
+          </a:prstGeom>
+          <a:noFill/>
+        </p:spPr>
+        <p:txBody>
+          <a:bodyPr wrap="square" rtlCol="0">
+            <a:spAutoFit/>
+          </a:bodyPr>
+          <a:lstStyle/>
+          <a:p>
+            <a:r>
+              <a:rPr lang="en-US" dirty="0">
+                <a:solidFill>
+                  <a:schemeClr val="tx1">
+                    <a:lumMod val="95000"/>
+                    <a:lumOff val="5000"/>
+                  </a:schemeClr>
+                </a:solidFill>
+                <a:latin typeface="Times New Roman" panose="02020603050405020304" pitchFamily="18" charset="0"/>
+                <a:ea typeface="Cambria" panose="02040503050406030204" pitchFamily="18" charset="0"/>
+                <a:cs typeface="Times New Roman" panose="02020603050405020304" pitchFamily="18" charset="0"/>
+              </a:rPr>
+              <a:t>Sai Tejaswini Narne</a:t>
+            </a:r>
+            <a:endParaRPr lang="en-US" dirty="0">
+              <a:latin typeface="Times New Roman" panose="02020603050405020304" pitchFamily="18" charset="0"/>
+              <a:cs typeface="Times New Roman" panose="02020603050405020304" pitchFamily="18" charset="0"/>
+            </a:endParaRPr>
+          </a:p>
+        </p:txBody>
+      </p:sp>
+    </p:spTree>
+    <p:extLst>
+      <p:ext uri="{BB962C8B-B14F-4D97-AF65-F5344CB8AC3E}">
+        <p14:creationId xmlns:p14="http://schemas.microsoft.com/office/powerpoint/2010/main" val="4126762658"/>
+      </p:ext>
+    </p:extLst>
+  </p:cSld>
+  <p:clrMapOvr>
+    <a:masterClrMapping/>
+  </p:clrMapOvr>
+  <p:timing>
+    <p:tnLst>
+      <p:par>
+        <p:cTn id="1" dur="indefinite" restart="never" nodeType="tmRoot"/>
+      </p:par>
+    </p:tnLst>
+  </p:timing>
+</p:sld>
+</file>
+
+<file path=ppt/slides/slide14.xml><?xml version="1.0" encoding="utf-8"?>
+<p:sld xmlns:a="http://schemas.openxmlformats.org/drawingml/2006/main" xmlns:r="http://schemas.openxmlformats.org/officeDocument/2006/relationships" xmlns:p="http://schemas.openxmlformats.org/presentationml/2006/main">
+  <p:cSld>
+    <p:spTree>
+      <p:nvGrpSpPr>
+        <p:cNvPr id="1" name=""/>
+        <p:cNvGrpSpPr/>
+        <p:nvPr/>
+      </p:nvGrpSpPr>
+      <p:grpSpPr>
+        <a:xfrm>
+          <a:off x="0" y="0"/>
+          <a:ext cx="0" cy="0"/>
+          <a:chOff x="0" y="0"/>
+          <a:chExt cx="0" cy="0"/>
+        </a:xfrm>
+      </p:grpSpPr>
+      <p:sp>
+        <p:nvSpPr>
+          <p:cNvPr id="2" name="Title 1"/>
+          <p:cNvSpPr>
+            <a:spLocks noGrp="1"/>
+          </p:cNvSpPr>
+          <p:nvPr>
+            <p:ph type="title"/>
+          </p:nvPr>
+        </p:nvSpPr>
+        <p:spPr>
+          <a:xfrm>
+            <a:off x="677334" y="522515"/>
+            <a:ext cx="9132873" cy="1332411"/>
+          </a:xfrm>
+        </p:spPr>
+        <p:txBody>
+          <a:bodyPr>
+            <a:normAutofit/>
+          </a:bodyPr>
+          <a:lstStyle/>
+          <a:p>
+            <a:r>
+              <a:rPr lang="en-US" dirty="0" smtClean="0"/>
+              <a:t>If </a:t>
+            </a:r>
+            <a:r>
+              <a:rPr lang="en-US" dirty="0"/>
+              <a:t>and Else Conditions</a:t>
+            </a:r>
+            <a:br>
+              <a:rPr lang="en-US" dirty="0"/>
+            </a:br>
+            <a:endParaRPr lang="en-US" dirty="0"/>
+          </a:p>
+        </p:txBody>
+      </p:sp>
+      <p:sp>
+        <p:nvSpPr>
+          <p:cNvPr id="3" name="Content Placeholder 2"/>
+          <p:cNvSpPr>
+            <a:spLocks noGrp="1"/>
+          </p:cNvSpPr>
+          <p:nvPr>
+            <p:ph idx="1"/>
+          </p:nvPr>
+        </p:nvSpPr>
+        <p:spPr>
+          <a:xfrm>
+            <a:off x="677334" y="1436915"/>
+            <a:ext cx="8596668" cy="4304002"/>
+          </a:xfrm>
+        </p:spPr>
+        <p:txBody>
+          <a:bodyPr>
+            <a:noAutofit/>
+          </a:bodyPr>
+          <a:lstStyle/>
+          <a:p>
+            <a:r>
+              <a:rPr lang="en-US" dirty="0" smtClean="0">
+                <a:latin typeface="Times New Roman" panose="02020603050405020304" pitchFamily="18" charset="0"/>
+                <a:cs typeface="Times New Roman" panose="02020603050405020304" pitchFamily="18" charset="0"/>
+              </a:rPr>
+              <a:t>@{</a:t>
+            </a:r>
+            <a:r>
+              <a:rPr lang="en-US" dirty="0">
+                <a:latin typeface="Times New Roman" panose="02020603050405020304" pitchFamily="18" charset="0"/>
+                <a:cs typeface="Times New Roman" panose="02020603050405020304" pitchFamily="18" charset="0"/>
+              </a:rPr>
+              <a:t/>
+            </a:r>
+            <a:br>
+              <a:rPr lang="en-US" dirty="0">
+                <a:latin typeface="Times New Roman" panose="02020603050405020304" pitchFamily="18" charset="0"/>
+                <a:cs typeface="Times New Roman" panose="02020603050405020304" pitchFamily="18" charset="0"/>
+              </a:rPr>
+            </a:br>
+            <a:r>
+              <a:rPr lang="en-US" dirty="0">
+                <a:latin typeface="Times New Roman" panose="02020603050405020304" pitchFamily="18" charset="0"/>
+                <a:cs typeface="Times New Roman" panose="02020603050405020304" pitchFamily="18" charset="0"/>
+              </a:rPr>
+              <a:t>var txt = "";</a:t>
+            </a:r>
+            <a:br>
+              <a:rPr lang="en-US" dirty="0">
+                <a:latin typeface="Times New Roman" panose="02020603050405020304" pitchFamily="18" charset="0"/>
+                <a:cs typeface="Times New Roman" panose="02020603050405020304" pitchFamily="18" charset="0"/>
+              </a:rPr>
+            </a:br>
+            <a:r>
+              <a:rPr lang="en-US" dirty="0">
+                <a:latin typeface="Times New Roman" panose="02020603050405020304" pitchFamily="18" charset="0"/>
+                <a:cs typeface="Times New Roman" panose="02020603050405020304" pitchFamily="18" charset="0"/>
+              </a:rPr>
+              <a:t>if(</a:t>
+            </a:r>
+            <a:r>
+              <a:rPr lang="en-US" dirty="0" err="1">
+                <a:latin typeface="Times New Roman" panose="02020603050405020304" pitchFamily="18" charset="0"/>
+                <a:cs typeface="Times New Roman" panose="02020603050405020304" pitchFamily="18" charset="0"/>
+              </a:rPr>
+              <a:t>DateTime.Now.Hour</a:t>
+            </a:r>
+            <a:r>
+              <a:rPr lang="en-US" dirty="0">
+                <a:latin typeface="Times New Roman" panose="02020603050405020304" pitchFamily="18" charset="0"/>
+                <a:cs typeface="Times New Roman" panose="02020603050405020304" pitchFamily="18" charset="0"/>
+              </a:rPr>
+              <a:t> &gt; 12)</a:t>
+            </a:r>
+            <a:br>
+              <a:rPr lang="en-US" dirty="0">
+                <a:latin typeface="Times New Roman" panose="02020603050405020304" pitchFamily="18" charset="0"/>
+                <a:cs typeface="Times New Roman" panose="02020603050405020304" pitchFamily="18" charset="0"/>
+              </a:rPr>
+            </a:br>
+            <a:r>
+              <a:rPr lang="en-US" dirty="0">
+                <a:latin typeface="Times New Roman" panose="02020603050405020304" pitchFamily="18" charset="0"/>
+                <a:cs typeface="Times New Roman" panose="02020603050405020304" pitchFamily="18" charset="0"/>
+              </a:rPr>
+              <a:t>  {txt = "Good Evening";}</a:t>
+            </a:r>
+            <a:br>
+              <a:rPr lang="en-US" dirty="0">
+                <a:latin typeface="Times New Roman" panose="02020603050405020304" pitchFamily="18" charset="0"/>
+                <a:cs typeface="Times New Roman" panose="02020603050405020304" pitchFamily="18" charset="0"/>
+              </a:rPr>
+            </a:br>
+            <a:r>
+              <a:rPr lang="en-US" dirty="0">
+                <a:latin typeface="Times New Roman" panose="02020603050405020304" pitchFamily="18" charset="0"/>
+                <a:cs typeface="Times New Roman" panose="02020603050405020304" pitchFamily="18" charset="0"/>
+              </a:rPr>
+              <a:t>else</a:t>
+            </a:r>
+            <a:br>
+              <a:rPr lang="en-US" dirty="0">
+                <a:latin typeface="Times New Roman" panose="02020603050405020304" pitchFamily="18" charset="0"/>
+                <a:cs typeface="Times New Roman" panose="02020603050405020304" pitchFamily="18" charset="0"/>
+              </a:rPr>
+            </a:br>
+            <a:r>
+              <a:rPr lang="en-US" dirty="0">
+                <a:latin typeface="Times New Roman" panose="02020603050405020304" pitchFamily="18" charset="0"/>
+                <a:cs typeface="Times New Roman" panose="02020603050405020304" pitchFamily="18" charset="0"/>
+              </a:rPr>
+              <a:t>  {txt = "Good Morning";}</a:t>
+            </a:r>
+            <a:br>
+              <a:rPr lang="en-US" dirty="0">
+                <a:latin typeface="Times New Roman" panose="02020603050405020304" pitchFamily="18" charset="0"/>
+                <a:cs typeface="Times New Roman" panose="02020603050405020304" pitchFamily="18" charset="0"/>
+              </a:rPr>
+            </a:br>
+            <a:r>
+              <a:rPr lang="en-US" dirty="0">
+                <a:latin typeface="Times New Roman" panose="02020603050405020304" pitchFamily="18" charset="0"/>
+                <a:cs typeface="Times New Roman" panose="02020603050405020304" pitchFamily="18" charset="0"/>
+              </a:rPr>
+              <a:t>}</a:t>
+            </a:r>
+            <a:br>
+              <a:rPr lang="en-US" dirty="0">
+                <a:latin typeface="Times New Roman" panose="02020603050405020304" pitchFamily="18" charset="0"/>
+                <a:cs typeface="Times New Roman" panose="02020603050405020304" pitchFamily="18" charset="0"/>
+              </a:rPr>
+            </a:br>
+            <a:r>
+              <a:rPr lang="en-US" dirty="0">
+                <a:latin typeface="Times New Roman" panose="02020603050405020304" pitchFamily="18" charset="0"/>
+                <a:cs typeface="Times New Roman" panose="02020603050405020304" pitchFamily="18" charset="0"/>
+              </a:rPr>
+              <a:t>&lt;html&gt;</a:t>
+            </a:r>
+            <a:br>
+              <a:rPr lang="en-US" dirty="0">
+                <a:latin typeface="Times New Roman" panose="02020603050405020304" pitchFamily="18" charset="0"/>
+                <a:cs typeface="Times New Roman" panose="02020603050405020304" pitchFamily="18" charset="0"/>
+              </a:rPr>
+            </a:br>
+            <a:r>
+              <a:rPr lang="en-US" dirty="0">
+                <a:latin typeface="Times New Roman" panose="02020603050405020304" pitchFamily="18" charset="0"/>
+                <a:cs typeface="Times New Roman" panose="02020603050405020304" pitchFamily="18" charset="0"/>
+              </a:rPr>
+              <a:t>&lt;body&gt;</a:t>
+            </a:r>
+            <a:br>
+              <a:rPr lang="en-US" dirty="0">
+                <a:latin typeface="Times New Roman" panose="02020603050405020304" pitchFamily="18" charset="0"/>
+                <a:cs typeface="Times New Roman" panose="02020603050405020304" pitchFamily="18" charset="0"/>
+              </a:rPr>
+            </a:br>
+            <a:r>
+              <a:rPr lang="en-US" dirty="0">
+                <a:latin typeface="Times New Roman" panose="02020603050405020304" pitchFamily="18" charset="0"/>
+                <a:cs typeface="Times New Roman" panose="02020603050405020304" pitchFamily="18" charset="0"/>
+              </a:rPr>
+              <a:t>&lt;p&gt;The message is @txt&lt;/p&gt;</a:t>
+            </a:r>
+            <a:br>
+              <a:rPr lang="en-US" dirty="0">
+                <a:latin typeface="Times New Roman" panose="02020603050405020304" pitchFamily="18" charset="0"/>
+                <a:cs typeface="Times New Roman" panose="02020603050405020304" pitchFamily="18" charset="0"/>
+              </a:rPr>
+            </a:br>
+            <a:r>
+              <a:rPr lang="en-US" dirty="0">
+                <a:latin typeface="Times New Roman" panose="02020603050405020304" pitchFamily="18" charset="0"/>
+                <a:cs typeface="Times New Roman" panose="02020603050405020304" pitchFamily="18" charset="0"/>
+              </a:rPr>
+              <a:t>&lt;/body&gt;</a:t>
+            </a:r>
+            <a:br>
+              <a:rPr lang="en-US" dirty="0">
+                <a:latin typeface="Times New Roman" panose="02020603050405020304" pitchFamily="18" charset="0"/>
+                <a:cs typeface="Times New Roman" panose="02020603050405020304" pitchFamily="18" charset="0"/>
+              </a:rPr>
+            </a:br>
+            <a:r>
+              <a:rPr lang="en-US" dirty="0">
+                <a:latin typeface="Times New Roman" panose="02020603050405020304" pitchFamily="18" charset="0"/>
+                <a:cs typeface="Times New Roman" panose="02020603050405020304" pitchFamily="18" charset="0"/>
+              </a:rPr>
+              <a:t>&lt;/html</a:t>
+            </a:r>
+            <a:r>
+              <a:rPr lang="en-US" dirty="0" smtClean="0">
+                <a:latin typeface="Times New Roman" panose="02020603050405020304" pitchFamily="18" charset="0"/>
+                <a:cs typeface="Times New Roman" panose="02020603050405020304" pitchFamily="18" charset="0"/>
+              </a:rPr>
+              <a:t>&gt;</a:t>
+            </a:r>
+            <a:endParaRPr lang="en-US" dirty="0">
+              <a:latin typeface="Times New Roman" panose="02020603050405020304" pitchFamily="18" charset="0"/>
+              <a:ea typeface="Cambria" panose="02040503050406030204" pitchFamily="18" charset="0"/>
+              <a:cs typeface="Times New Roman" panose="02020603050405020304" pitchFamily="18" charset="0"/>
+            </a:endParaRPr>
+          </a:p>
+          <a:p>
+            <a:endParaRPr lang="en-US" dirty="0" smtClean="0">
+              <a:latin typeface="Times New Roman" panose="02020603050405020304" pitchFamily="18" charset="0"/>
+              <a:ea typeface="Cambria" panose="02040503050406030204" pitchFamily="18" charset="0"/>
+              <a:cs typeface="Times New Roman" panose="02020603050405020304" pitchFamily="18" charset="0"/>
+            </a:endParaRPr>
+          </a:p>
+          <a:p>
+            <a:r>
+              <a:rPr lang="en-US" dirty="0" smtClean="0">
+                <a:latin typeface="Times New Roman" panose="02020603050405020304" pitchFamily="18" charset="0"/>
+                <a:ea typeface="Cambria" panose="02040503050406030204" pitchFamily="18" charset="0"/>
+                <a:cs typeface="Times New Roman" panose="02020603050405020304" pitchFamily="18" charset="0"/>
+              </a:rPr>
+              <a:t>Output: </a:t>
+            </a:r>
+            <a:r>
+              <a:rPr lang="en-US" dirty="0">
+                <a:latin typeface="Times New Roman" panose="02020603050405020304" pitchFamily="18" charset="0"/>
+                <a:cs typeface="Times New Roman" panose="02020603050405020304" pitchFamily="18" charset="0"/>
+              </a:rPr>
+              <a:t>The message is Good Evening</a:t>
+            </a:r>
+            <a:endParaRPr lang="en-US" dirty="0" smtClean="0">
+              <a:latin typeface="Times New Roman" panose="02020603050405020304" pitchFamily="18" charset="0"/>
+              <a:ea typeface="Cambria" panose="02040503050406030204" pitchFamily="18" charset="0"/>
+              <a:cs typeface="Times New Roman" panose="02020603050405020304" pitchFamily="18" charset="0"/>
+            </a:endParaRPr>
+          </a:p>
+        </p:txBody>
+      </p:sp>
+      <p:sp>
+        <p:nvSpPr>
+          <p:cNvPr id="5" name="TextBox 4"/>
+          <p:cNvSpPr txBox="1"/>
+          <p:nvPr/>
+        </p:nvSpPr>
+        <p:spPr>
+          <a:xfrm>
+            <a:off x="7406641" y="5353986"/>
+            <a:ext cx="2298436" cy="369332"/>
+          </a:xfrm>
+          <a:prstGeom prst="rect">
+            <a:avLst/>
+          </a:prstGeom>
+          <a:noFill/>
+        </p:spPr>
+        <p:txBody>
+          <a:bodyPr wrap="square" rtlCol="0">
+            <a:spAutoFit/>
+          </a:bodyPr>
+          <a:lstStyle/>
+          <a:p>
+            <a:r>
+              <a:rPr lang="en-US" dirty="0">
+                <a:solidFill>
+                  <a:schemeClr val="tx1">
+                    <a:lumMod val="95000"/>
+                    <a:lumOff val="5000"/>
+                  </a:schemeClr>
+                </a:solidFill>
+                <a:latin typeface="Times New Roman" panose="02020603050405020304" pitchFamily="18" charset="0"/>
+                <a:ea typeface="Cambria" panose="02040503050406030204" pitchFamily="18" charset="0"/>
+                <a:cs typeface="Times New Roman" panose="02020603050405020304" pitchFamily="18" charset="0"/>
+              </a:rPr>
+              <a:t>Sai Tejaswini Narne</a:t>
+            </a:r>
+            <a:endParaRPr lang="en-US" dirty="0">
+              <a:latin typeface="Times New Roman" panose="02020603050405020304" pitchFamily="18" charset="0"/>
+              <a:cs typeface="Times New Roman" panose="02020603050405020304" pitchFamily="18" charset="0"/>
+            </a:endParaRPr>
+          </a:p>
+        </p:txBody>
+      </p:sp>
+    </p:spTree>
+    <p:extLst>
+      <p:ext uri="{BB962C8B-B14F-4D97-AF65-F5344CB8AC3E}">
+        <p14:creationId xmlns:p14="http://schemas.microsoft.com/office/powerpoint/2010/main" val="627571273"/>
+      </p:ext>
+    </p:extLst>
+  </p:cSld>
+  <p:clrMapOvr>
+    <a:masterClrMapping/>
+  </p:clrMapOvr>
+  <p:timing>
+    <p:tnLst>
+      <p:par>
+        <p:cTn id="1" dur="indefinite" restart="never" nodeType="tmRoot"/>
+      </p:par>
+    </p:tnLst>
+  </p:timing>
+</p:sld>
+</file>
+
+<file path=ppt/slides/slide15.xml><?xml version="1.0" encoding="utf-8"?>
+<p:sld xmlns:a="http://schemas.openxmlformats.org/drawingml/2006/main" xmlns:r="http://schemas.openxmlformats.org/officeDocument/2006/relationships" xmlns:p="http://schemas.openxmlformats.org/presentationml/2006/main">
+  <p:cSld>
+    <p:spTree>
+      <p:nvGrpSpPr>
+        <p:cNvPr id="1" name=""/>
+        <p:cNvGrpSpPr/>
+        <p:nvPr/>
+      </p:nvGrpSpPr>
+      <p:grpSpPr>
+        <a:xfrm>
+          <a:off x="0" y="0"/>
+          <a:ext cx="0" cy="0"/>
+          <a:chOff x="0" y="0"/>
+          <a:chExt cx="0" cy="0"/>
+        </a:xfrm>
+      </p:grpSpPr>
+      <p:sp>
+        <p:nvSpPr>
+          <p:cNvPr id="2" name="Title 1"/>
+          <p:cNvSpPr>
+            <a:spLocks noGrp="1"/>
+          </p:cNvSpPr>
+          <p:nvPr>
+            <p:ph type="title"/>
+          </p:nvPr>
+        </p:nvSpPr>
+        <p:spPr>
+          <a:xfrm>
+            <a:off x="677334" y="809896"/>
+            <a:ext cx="8596668" cy="1120503"/>
+          </a:xfrm>
+        </p:spPr>
+        <p:txBody>
+          <a:bodyPr/>
+          <a:lstStyle/>
+          <a:p>
+            <a:r>
+              <a:rPr lang="en-US" dirty="0" smtClean="0"/>
+              <a:t>Advantages of Razor Syntax</a:t>
+            </a:r>
+            <a:endParaRPr lang="en-US" dirty="0"/>
+          </a:p>
+        </p:txBody>
+      </p:sp>
+      <p:sp>
+        <p:nvSpPr>
+          <p:cNvPr id="3" name="Content Placeholder 2"/>
+          <p:cNvSpPr>
+            <a:spLocks noGrp="1"/>
+          </p:cNvSpPr>
+          <p:nvPr>
+            <p:ph idx="1"/>
+          </p:nvPr>
+        </p:nvSpPr>
+        <p:spPr>
+          <a:xfrm>
+            <a:off x="677334" y="1755640"/>
+            <a:ext cx="8596668" cy="3880773"/>
+          </a:xfrm>
+        </p:spPr>
+        <p:txBody>
+          <a:bodyPr>
+            <a:normAutofit/>
+          </a:bodyPr>
+          <a:lstStyle/>
+          <a:p>
+            <a:r>
+              <a:rPr lang="en-US" dirty="0" smtClean="0">
+                <a:latin typeface="Times New Roman" panose="02020603050405020304" pitchFamily="18" charset="0"/>
+                <a:cs typeface="Times New Roman" panose="02020603050405020304" pitchFamily="18" charset="0"/>
+              </a:rPr>
+              <a:t>It </a:t>
+            </a:r>
+            <a:r>
+              <a:rPr lang="en-US" dirty="0">
+                <a:latin typeface="Times New Roman" panose="02020603050405020304" pitchFamily="18" charset="0"/>
+                <a:cs typeface="Times New Roman" panose="02020603050405020304" pitchFamily="18" charset="0"/>
+              </a:rPr>
+              <a:t>is light weight and it has a simple syntax.</a:t>
+            </a:r>
+          </a:p>
+          <a:p>
+            <a:r>
+              <a:rPr lang="en-US" dirty="0">
+                <a:latin typeface="Times New Roman" panose="02020603050405020304" pitchFamily="18" charset="0"/>
+                <a:cs typeface="Times New Roman" panose="02020603050405020304" pitchFamily="18" charset="0"/>
+              </a:rPr>
+              <a:t>It is easier to understand Razor</a:t>
+            </a:r>
+            <a:r>
+              <a:rPr lang="en-US" b="1" dirty="0">
+                <a:latin typeface="Times New Roman" panose="02020603050405020304" pitchFamily="18" charset="0"/>
+                <a:cs typeface="Times New Roman" panose="02020603050405020304" pitchFamily="18" charset="0"/>
+              </a:rPr>
+              <a:t> </a:t>
+            </a:r>
+            <a:r>
+              <a:rPr lang="en-US" dirty="0">
+                <a:latin typeface="Times New Roman" panose="02020603050405020304" pitchFamily="18" charset="0"/>
+                <a:cs typeface="Times New Roman" panose="02020603050405020304" pitchFamily="18" charset="0"/>
+              </a:rPr>
+              <a:t>syntax as compared to ASPX view engine syntax</a:t>
+            </a:r>
+            <a:r>
+              <a:rPr lang="en-US" dirty="0" smtClean="0">
+                <a:latin typeface="Times New Roman" panose="02020603050405020304" pitchFamily="18" charset="0"/>
+                <a:cs typeface="Times New Roman" panose="02020603050405020304" pitchFamily="18" charset="0"/>
+              </a:rPr>
+              <a:t>.</a:t>
+            </a:r>
+          </a:p>
+          <a:p>
+            <a:r>
+              <a:rPr lang="en-US" dirty="0">
+                <a:latin typeface="Times New Roman" panose="02020603050405020304" pitchFamily="18" charset="0"/>
+                <a:cs typeface="Times New Roman" panose="02020603050405020304" pitchFamily="18" charset="0"/>
+              </a:rPr>
+              <a:t>Provides automatic encoding of HTML </a:t>
+            </a:r>
+            <a:r>
+              <a:rPr lang="en-US" dirty="0" smtClean="0">
+                <a:latin typeface="Times New Roman" panose="02020603050405020304" pitchFamily="18" charset="0"/>
+                <a:cs typeface="Times New Roman" panose="02020603050405020304" pitchFamily="18" charset="0"/>
+              </a:rPr>
+              <a:t>output.</a:t>
+            </a:r>
+          </a:p>
+          <a:p>
+            <a:r>
+              <a:rPr lang="en-US" dirty="0" smtClean="0">
+                <a:latin typeface="Times New Roman" panose="02020603050405020304" pitchFamily="18" charset="0"/>
+                <a:cs typeface="Times New Roman" panose="02020603050405020304" pitchFamily="18" charset="0"/>
+              </a:rPr>
+              <a:t>Provides </a:t>
+            </a:r>
+            <a:r>
+              <a:rPr lang="en-US" dirty="0">
+                <a:latin typeface="Times New Roman" panose="02020603050405020304" pitchFamily="18" charset="0"/>
+                <a:cs typeface="Times New Roman" panose="02020603050405020304" pitchFamily="18" charset="0"/>
+              </a:rPr>
+              <a:t>great readability of markup and code</a:t>
+            </a:r>
+            <a:r>
+              <a:rPr lang="en-US" dirty="0" smtClean="0">
+                <a:latin typeface="Times New Roman" panose="02020603050405020304" pitchFamily="18" charset="0"/>
+                <a:cs typeface="Times New Roman" panose="02020603050405020304" pitchFamily="18" charset="0"/>
+              </a:rPr>
+              <a:t>.</a:t>
+            </a:r>
+          </a:p>
+          <a:p>
+            <a:r>
+              <a:rPr lang="en-US" dirty="0">
+                <a:latin typeface="Times New Roman" panose="02020603050405020304" pitchFamily="18" charset="0"/>
+                <a:cs typeface="Times New Roman" panose="02020603050405020304" pitchFamily="18" charset="0"/>
+              </a:rPr>
+              <a:t>Razor does not require any special tool to write markup. We can also write our markup code with any old plain text editor like Notepad.</a:t>
+            </a:r>
+          </a:p>
+          <a:p>
+            <a:r>
+              <a:rPr lang="en-US" dirty="0">
+                <a:latin typeface="Times New Roman" panose="02020603050405020304" pitchFamily="18" charset="0"/>
+                <a:cs typeface="Times New Roman" panose="02020603050405020304" pitchFamily="18" charset="0"/>
+              </a:rPr>
+              <a:t>Easy to Learn: Razor is easy to learn. We can also use our existing HTML skills.</a:t>
+            </a:r>
+          </a:p>
+          <a:p>
+            <a:pPr marL="0" indent="0">
+              <a:buNone/>
+            </a:pPr>
+            <a:endParaRPr lang="en-US" dirty="0">
+              <a:latin typeface="Times New Roman" panose="02020603050405020304" pitchFamily="18" charset="0"/>
+              <a:cs typeface="Times New Roman" panose="02020603050405020304" pitchFamily="18" charset="0"/>
+            </a:endParaRPr>
+          </a:p>
+          <a:p>
+            <a:pPr marL="0" indent="0">
+              <a:buNone/>
+            </a:pPr>
+            <a:endParaRPr lang="en-US" b="1" dirty="0" smtClean="0">
+              <a:latin typeface="Times New Roman" panose="02020603050405020304" pitchFamily="18" charset="0"/>
+              <a:cs typeface="Times New Roman" panose="02020603050405020304" pitchFamily="18" charset="0"/>
+            </a:endParaRPr>
+          </a:p>
+          <a:p>
+            <a:endParaRPr lang="en-US" dirty="0" smtClean="0">
+              <a:latin typeface="Times New Roman" panose="02020603050405020304" pitchFamily="18" charset="0"/>
+              <a:cs typeface="Times New Roman" panose="02020603050405020304" pitchFamily="18" charset="0"/>
+            </a:endParaRPr>
+          </a:p>
+          <a:p>
+            <a:endParaRPr lang="en-US" dirty="0">
+              <a:latin typeface="Times New Roman" panose="02020603050405020304" pitchFamily="18" charset="0"/>
+              <a:cs typeface="Times New Roman" panose="02020603050405020304" pitchFamily="18" charset="0"/>
+            </a:endParaRPr>
+          </a:p>
+        </p:txBody>
+      </p:sp>
+      <p:sp>
+        <p:nvSpPr>
+          <p:cNvPr id="5" name="TextBox 4"/>
+          <p:cNvSpPr txBox="1"/>
+          <p:nvPr/>
+        </p:nvSpPr>
+        <p:spPr>
+          <a:xfrm>
+            <a:off x="7406641" y="5353986"/>
+            <a:ext cx="2298436" cy="369332"/>
+          </a:xfrm>
+          <a:prstGeom prst="rect">
+            <a:avLst/>
+          </a:prstGeom>
+          <a:noFill/>
+        </p:spPr>
+        <p:txBody>
+          <a:bodyPr wrap="square" rtlCol="0">
+            <a:spAutoFit/>
+          </a:bodyPr>
+          <a:lstStyle/>
+          <a:p>
+            <a:r>
+              <a:rPr lang="en-US" dirty="0">
+                <a:solidFill>
+                  <a:schemeClr val="tx1">
+                    <a:lumMod val="95000"/>
+                    <a:lumOff val="5000"/>
+                  </a:schemeClr>
+                </a:solidFill>
+                <a:latin typeface="Times New Roman" panose="02020603050405020304" pitchFamily="18" charset="0"/>
+                <a:ea typeface="Cambria" panose="02040503050406030204" pitchFamily="18" charset="0"/>
+                <a:cs typeface="Times New Roman" panose="02020603050405020304" pitchFamily="18" charset="0"/>
+              </a:rPr>
+              <a:t>Sai Tejaswini Narne</a:t>
+            </a:r>
+            <a:endParaRPr lang="en-US" dirty="0">
+              <a:latin typeface="Times New Roman" panose="02020603050405020304" pitchFamily="18" charset="0"/>
+              <a:cs typeface="Times New Roman" panose="02020603050405020304" pitchFamily="18" charset="0"/>
+            </a:endParaRPr>
+          </a:p>
+        </p:txBody>
+      </p:sp>
+    </p:spTree>
+    <p:extLst>
+      <p:ext uri="{BB962C8B-B14F-4D97-AF65-F5344CB8AC3E}">
+        <p14:creationId xmlns:p14="http://schemas.microsoft.com/office/powerpoint/2010/main" val="2402378871"/>
+      </p:ext>
+    </p:extLst>
+  </p:cSld>
+  <p:clrMapOvr>
+    <a:masterClrMapping/>
+  </p:clrMapOvr>
+</p:sld>
+</file>
+
+<file path=ppt/slides/slide16.xml><?xml version="1.0" encoding="utf-8"?>
+<p:sld xmlns:a="http://schemas.openxmlformats.org/drawingml/2006/main" xmlns:r="http://schemas.openxmlformats.org/officeDocument/2006/relationships" xmlns:p="http://schemas.openxmlformats.org/presentationml/2006/main">
+  <p:cSld>
+    <p:spTree>
+      <p:nvGrpSpPr>
+        <p:cNvPr id="1" name=""/>
+        <p:cNvGrpSpPr/>
+        <p:nvPr/>
+      </p:nvGrpSpPr>
+      <p:grpSpPr>
+        <a:xfrm>
+          <a:off x="0" y="0"/>
+          <a:ext cx="0" cy="0"/>
+          <a:chOff x="0" y="0"/>
+          <a:chExt cx="0" cy="0"/>
+        </a:xfrm>
+      </p:grpSpPr>
+      <p:sp>
+        <p:nvSpPr>
+          <p:cNvPr id="2" name="Title 1"/>
+          <p:cNvSpPr>
+            <a:spLocks noGrp="1"/>
+          </p:cNvSpPr>
+          <p:nvPr>
+            <p:ph type="title"/>
+          </p:nvPr>
+        </p:nvSpPr>
+        <p:spPr>
+          <a:xfrm>
             <a:off x="677334" y="609599"/>
             <a:ext cx="3104444" cy="643467"/>
           </a:xfrm>
@@ -6339,7 +7847,7 @@
 </p:sld>
 </file>
 
-<file path=ppt/slides/slide11.xml><?xml version="1.0" encoding="utf-8"?>
+<file path=ppt/slides/slide17.xml><?xml version="1.0" encoding="utf-8"?>
 <p:sld xmlns:a="http://schemas.openxmlformats.org/drawingml/2006/main" xmlns:r="http://schemas.openxmlformats.org/officeDocument/2006/relationships" xmlns:p="http://schemas.openxmlformats.org/presentationml/2006/main">
   <p:cSld>
     <p:spTree>
@@ -6448,7 +7956,12 @@
             <p:ph idx="1"/>
           </p:nvPr>
         </p:nvSpPr>
-        <p:spPr/>
+        <p:spPr>
+          <a:xfrm>
+            <a:off x="677334" y="1737891"/>
+            <a:ext cx="8596668" cy="3880773"/>
+          </a:xfrm>
+        </p:spPr>
         <p:txBody>
           <a:bodyPr>
             <a:normAutofit/>
@@ -6555,7 +8068,7 @@
         </p:nvSpPr>
         <p:spPr>
           <a:xfrm>
-            <a:off x="677334" y="2160589"/>
+            <a:off x="677334" y="1677263"/>
             <a:ext cx="8596668" cy="2693633"/>
           </a:xfrm>
         </p:spPr>
@@ -6577,51 +8090,40 @@
                 <a:latin typeface="Cambria" panose="02040503050406030204" pitchFamily="18" charset="0"/>
                 <a:ea typeface="Cambria" panose="02040503050406030204" pitchFamily="18" charset="0"/>
               </a:rPr>
-              <a:t>C# </a:t>
-            </a:r>
+              <a:t>C# .</a:t>
+            </a:r>
+          </a:p>
+          <a:p>
             <a:r>
               <a:rPr lang="en-US" sz="2400" dirty="0" smtClean="0">
                 <a:latin typeface="Cambria" panose="02040503050406030204" pitchFamily="18" charset="0"/>
                 <a:ea typeface="Cambria" panose="02040503050406030204" pitchFamily="18" charset="0"/>
               </a:rPr>
-              <a:t>.</a:t>
-            </a:r>
-          </a:p>
-          <a:p>
+              <a:t>Razor is </a:t>
+            </a:r>
+            <a:r>
+              <a:rPr lang="en-US" sz="2400" dirty="0">
+                <a:latin typeface="Cambria" panose="02040503050406030204" pitchFamily="18" charset="0"/>
+                <a:ea typeface="Cambria" panose="02040503050406030204" pitchFamily="18" charset="0"/>
+              </a:rPr>
+              <a:t>not a programming language. It is a server side markup language</a:t>
+            </a:r>
             <a:r>
               <a:rPr lang="en-US" sz="2400" dirty="0" smtClean="0">
                 <a:latin typeface="Cambria" panose="02040503050406030204" pitchFamily="18" charset="0"/>
                 <a:ea typeface="Cambria" panose="02040503050406030204" pitchFamily="18" charset="0"/>
               </a:rPr>
-              <a:t>Razor is </a:t>
-            </a:r>
-            <a:r>
-              <a:rPr lang="en-US" sz="2400" dirty="0">
-                <a:latin typeface="Cambria" panose="02040503050406030204" pitchFamily="18" charset="0"/>
-                <a:ea typeface="Cambria" panose="02040503050406030204" pitchFamily="18" charset="0"/>
-              </a:rPr>
-              <a:t>not a programming language. It is a server side markup language</a:t>
-            </a:r>
+              <a:t>.</a:t>
+            </a:r>
+          </a:p>
+          <a:p>
             <a:r>
               <a:rPr lang="en-US" sz="2400" dirty="0" smtClean="0">
                 <a:latin typeface="Cambria" panose="02040503050406030204" pitchFamily="18" charset="0"/>
                 <a:ea typeface="Cambria" panose="02040503050406030204" pitchFamily="18" charset="0"/>
               </a:rPr>
-              <a:t>.</a:t>
-            </a:r>
-          </a:p>
-          <a:p>
-            <a:r>
-              <a:rPr lang="en-US" sz="2400" dirty="0" smtClean="0">
-                <a:latin typeface="Cambria" panose="02040503050406030204" pitchFamily="18" charset="0"/>
-                <a:ea typeface="Cambria" panose="02040503050406030204" pitchFamily="18" charset="0"/>
-              </a:rPr>
               <a:t>Razor uses a Syntax similar to the PHP and Classic ASP.</a:t>
             </a:r>
-            <a:endParaRPr lang="en-US" sz="2400" dirty="0" smtClean="0">
-              <a:latin typeface="Cambria" panose="02040503050406030204" pitchFamily="18" charset="0"/>
-              <a:ea typeface="Cambria" panose="02040503050406030204" pitchFamily="18" charset="0"/>
-            </a:endParaRPr>
           </a:p>
           <a:p>
             <a:pPr marL="0" indent="0">
@@ -6969,7 +8471,7 @@
         </p:nvSpPr>
         <p:spPr>
           <a:xfrm>
-            <a:off x="677334" y="1755640"/>
+            <a:off x="677334" y="1553225"/>
             <a:ext cx="8596668" cy="3880773"/>
           </a:xfrm>
         </p:spPr>
@@ -7266,7 +8768,12 @@
             <p:ph idx="1"/>
           </p:nvPr>
         </p:nvSpPr>
-        <p:spPr/>
+        <p:spPr>
+          <a:xfrm>
+            <a:off x="677334" y="1553225"/>
+            <a:ext cx="8596668" cy="3880773"/>
+          </a:xfrm>
+        </p:spPr>
         <p:txBody>
           <a:bodyPr>
             <a:normAutofit/>
@@ -7454,6 +8961,13 @@
   <p:clrMapOvr>
     <a:masterClrMapping/>
   </p:clrMapOvr>
+  <p:timing>
+    <p:tnLst>
+      <p:par>
+        <p:cTn id="1" dur="indefinite" restart="never" nodeType="tmRoot"/>
+      </p:par>
+    </p:tnLst>
+  </p:timing>
 </p:sld>
 </file>
 
@@ -7520,7 +9034,12 @@
             <p:ph idx="1"/>
           </p:nvPr>
         </p:nvSpPr>
-        <p:spPr/>
+        <p:spPr>
+          <a:xfrm>
+            <a:off x="677334" y="1553225"/>
+            <a:ext cx="8596668" cy="3880773"/>
+          </a:xfrm>
+        </p:spPr>
         <p:txBody>
           <a:bodyPr/>
           <a:lstStyle/>
@@ -7628,6 +9147,13 @@
   <p:clrMapOvr>
     <a:masterClrMapping/>
   </p:clrMapOvr>
+  <p:timing>
+    <p:tnLst>
+      <p:par>
+        <p:cTn id="1" dur="indefinite" restart="never" nodeType="tmRoot"/>
+      </p:par>
+    </p:tnLst>
+  </p:timing>
 </p:sld>
 </file>
 
@@ -7658,30 +9184,12 @@
             <p:ph type="title"/>
           </p:nvPr>
         </p:nvSpPr>
-        <p:spPr/>
-        <p:txBody>
-          <a:bodyPr/>
-          <a:lstStyle/>
-          <a:p>
-            <a:r>
-              <a:rPr lang="en-US" dirty="0" smtClean="0"/>
-              <a:t>Razor Syntax</a:t>
-            </a:r>
-            <a:endParaRPr lang="en-US" dirty="0"/>
-          </a:p>
-        </p:txBody>
-      </p:sp>
-      <p:sp>
-        <p:nvSpPr>
-          <p:cNvPr id="3" name="Content Placeholder 2"/>
-          <p:cNvSpPr>
-            <a:spLocks noGrp="1"/>
-          </p:cNvSpPr>
-          <p:nvPr>
-            <p:ph idx="1"/>
-          </p:nvPr>
-        </p:nvSpPr>
-        <p:spPr/>
+        <p:spPr>
+          <a:xfrm>
+            <a:off x="3056709" y="2612571"/>
+            <a:ext cx="4963885" cy="1227909"/>
+          </a:xfrm>
+        </p:spPr>
         <p:txBody>
           <a:bodyPr>
             <a:noAutofit/>
@@ -7689,216 +9197,23 @@
           <a:lstStyle/>
           <a:p>
             <a:r>
-              <a:rPr lang="en-US" dirty="0" smtClean="0">
-                <a:latin typeface="Cambria" panose="02040503050406030204" pitchFamily="18" charset="0"/>
-                <a:ea typeface="Cambria" panose="02040503050406030204" pitchFamily="18" charset="0"/>
-              </a:rPr>
-              <a:t>If-Blocks Statements</a:t>
-            </a:r>
-            <a:endParaRPr lang="en-US" dirty="0">
-              <a:latin typeface="Cambria" panose="02040503050406030204" pitchFamily="18" charset="0"/>
-              <a:ea typeface="Cambria" panose="02040503050406030204" pitchFamily="18" charset="0"/>
-            </a:endParaRPr>
-          </a:p>
-          <a:p>
-            <a:pPr marL="0" indent="0">
-              <a:buNone/>
-            </a:pPr>
-            <a:r>
-              <a:rPr lang="en-US" dirty="0" smtClean="0">
-                <a:latin typeface="Cambria" panose="02040503050406030204" pitchFamily="18" charset="0"/>
-                <a:ea typeface="Cambria" panose="02040503050406030204" pitchFamily="18" charset="0"/>
-              </a:rPr>
-              <a:t>         @if(</a:t>
-            </a:r>
-            <a:r>
-              <a:rPr lang="en-US" dirty="0" err="1" smtClean="0">
-                <a:latin typeface="Cambria" panose="02040503050406030204" pitchFamily="18" charset="0"/>
-                <a:ea typeface="Cambria" panose="02040503050406030204" pitchFamily="18" charset="0"/>
-              </a:rPr>
-              <a:t>products.Count</a:t>
-            </a:r>
-            <a:r>
-              <a:rPr lang="en-US" dirty="0" smtClean="0">
-                <a:latin typeface="Cambria" panose="02040503050406030204" pitchFamily="18" charset="0"/>
-                <a:ea typeface="Cambria" panose="02040503050406030204" pitchFamily="18" charset="0"/>
-              </a:rPr>
-              <a:t> == 0)</a:t>
-            </a:r>
-          </a:p>
-          <a:p>
-            <a:pPr marL="0" indent="0">
-              <a:buNone/>
-            </a:pPr>
-            <a:r>
-              <a:rPr lang="en-US" dirty="0">
-                <a:latin typeface="Cambria" panose="02040503050406030204" pitchFamily="18" charset="0"/>
-                <a:ea typeface="Cambria" panose="02040503050406030204" pitchFamily="18" charset="0"/>
-              </a:rPr>
-              <a:t> </a:t>
-            </a:r>
-            <a:r>
-              <a:rPr lang="en-US" dirty="0" smtClean="0">
-                <a:latin typeface="Cambria" panose="02040503050406030204" pitchFamily="18" charset="0"/>
-                <a:ea typeface="Cambria" panose="02040503050406030204" pitchFamily="18" charset="0"/>
-              </a:rPr>
-              <a:t>             {</a:t>
-            </a:r>
-          </a:p>
-          <a:p>
-            <a:pPr marL="0" indent="0">
-              <a:buNone/>
-            </a:pPr>
-            <a:r>
-              <a:rPr lang="en-US" dirty="0" smtClean="0">
-                <a:latin typeface="Cambria" panose="02040503050406030204" pitchFamily="18" charset="0"/>
-                <a:ea typeface="Cambria" panose="02040503050406030204" pitchFamily="18" charset="0"/>
-              </a:rPr>
-              <a:t>                  &lt;p&gt;Not super exciting is it?&lt;/p&gt; </a:t>
-            </a:r>
-          </a:p>
-          <a:p>
-            <a:pPr marL="0" indent="0">
-              <a:buNone/>
-            </a:pPr>
-            <a:r>
-              <a:rPr lang="en-US" dirty="0">
-                <a:latin typeface="Cambria" panose="02040503050406030204" pitchFamily="18" charset="0"/>
-                <a:ea typeface="Cambria" panose="02040503050406030204" pitchFamily="18" charset="0"/>
-              </a:rPr>
-              <a:t> </a:t>
-            </a:r>
-            <a:r>
-              <a:rPr lang="en-US" dirty="0" smtClean="0">
-                <a:latin typeface="Cambria" panose="02040503050406030204" pitchFamily="18" charset="0"/>
-                <a:ea typeface="Cambria" panose="02040503050406030204" pitchFamily="18" charset="0"/>
-              </a:rPr>
-              <a:t>             }</a:t>
-            </a:r>
-          </a:p>
-          <a:p>
-            <a:pPr marL="0" indent="0">
-              <a:buNone/>
-            </a:pPr>
-            <a:r>
-              <a:rPr lang="en-US" dirty="0">
-                <a:latin typeface="Cambria" panose="02040503050406030204" pitchFamily="18" charset="0"/>
-                <a:ea typeface="Cambria" panose="02040503050406030204" pitchFamily="18" charset="0"/>
-              </a:rPr>
-              <a:t> </a:t>
-            </a:r>
-            <a:r>
-              <a:rPr lang="en-US" dirty="0" smtClean="0">
-                <a:latin typeface="Cambria" panose="02040503050406030204" pitchFamily="18" charset="0"/>
-                <a:ea typeface="Cambria" panose="02040503050406030204" pitchFamily="18" charset="0"/>
-              </a:rPr>
-              <a:t>          else</a:t>
-            </a:r>
-          </a:p>
-          <a:p>
-            <a:pPr marL="0" indent="0">
-              <a:buNone/>
-            </a:pPr>
-            <a:r>
-              <a:rPr lang="en-US" dirty="0" smtClean="0">
-                <a:latin typeface="Cambria" panose="02040503050406030204" pitchFamily="18" charset="0"/>
-                <a:ea typeface="Cambria" panose="02040503050406030204" pitchFamily="18" charset="0"/>
-              </a:rPr>
-              <a:t>	   {</a:t>
-            </a:r>
-          </a:p>
-          <a:p>
-            <a:pPr marL="0" indent="0">
-              <a:buNone/>
-            </a:pPr>
-            <a:r>
-              <a:rPr lang="en-US" dirty="0">
-                <a:latin typeface="Cambria" panose="02040503050406030204" pitchFamily="18" charset="0"/>
-                <a:ea typeface="Cambria" panose="02040503050406030204" pitchFamily="18" charset="0"/>
-              </a:rPr>
-              <a:t> </a:t>
-            </a:r>
-            <a:r>
-              <a:rPr lang="en-US" dirty="0" smtClean="0">
-                <a:latin typeface="Cambria" panose="02040503050406030204" pitchFamily="18" charset="0"/>
-                <a:ea typeface="Cambria" panose="02040503050406030204" pitchFamily="18" charset="0"/>
-              </a:rPr>
-              <a:t>                 &lt;p&gt;It is exciting!&lt;/p&gt;</a:t>
-            </a:r>
-          </a:p>
-          <a:p>
-            <a:pPr marL="0" indent="0">
-              <a:buNone/>
-            </a:pPr>
-            <a:r>
-              <a:rPr lang="en-US" dirty="0">
-                <a:latin typeface="Cambria" panose="02040503050406030204" pitchFamily="18" charset="0"/>
-                <a:ea typeface="Cambria" panose="02040503050406030204" pitchFamily="18" charset="0"/>
-              </a:rPr>
-              <a:t>	</a:t>
-            </a:r>
-            <a:r>
-              <a:rPr lang="en-US" dirty="0" smtClean="0">
-                <a:latin typeface="Cambria" panose="02040503050406030204" pitchFamily="18" charset="0"/>
-                <a:ea typeface="Cambria" panose="02040503050406030204" pitchFamily="18" charset="0"/>
-              </a:rPr>
-              <a:t>   }</a:t>
-            </a:r>
-          </a:p>
-          <a:p>
-            <a:pPr marL="0" indent="0">
-              <a:buNone/>
-            </a:pPr>
-            <a:r>
-              <a:rPr lang="en-US" dirty="0">
-                <a:latin typeface="Cambria" panose="02040503050406030204" pitchFamily="18" charset="0"/>
-                <a:ea typeface="Cambria" panose="02040503050406030204" pitchFamily="18" charset="0"/>
-              </a:rPr>
-              <a:t> </a:t>
-            </a:r>
-            <a:r>
-              <a:rPr lang="en-US" dirty="0" smtClean="0">
-                <a:latin typeface="Cambria" panose="02040503050406030204" pitchFamily="18" charset="0"/>
-                <a:ea typeface="Cambria" panose="02040503050406030204" pitchFamily="18" charset="0"/>
-              </a:rPr>
-              <a:t>     </a:t>
-            </a:r>
-          </a:p>
-          <a:p>
-            <a:pPr marL="0" indent="0">
-              <a:buNone/>
-            </a:pPr>
-            <a:r>
-              <a:rPr lang="en-US" dirty="0">
-                <a:latin typeface="Cambria" panose="02040503050406030204" pitchFamily="18" charset="0"/>
-                <a:ea typeface="Cambria" panose="02040503050406030204" pitchFamily="18" charset="0"/>
-              </a:rPr>
-              <a:t> </a:t>
-            </a:r>
-            <a:r>
-              <a:rPr lang="en-US" dirty="0" smtClean="0">
-                <a:latin typeface="Cambria" panose="02040503050406030204" pitchFamily="18" charset="0"/>
-                <a:ea typeface="Cambria" panose="02040503050406030204" pitchFamily="18" charset="0"/>
-              </a:rPr>
-              <a:t>     </a:t>
-            </a:r>
-            <a:endParaRPr lang="en-US" dirty="0">
-              <a:latin typeface="Cambria" panose="02040503050406030204" pitchFamily="18" charset="0"/>
-              <a:ea typeface="Cambria" panose="02040503050406030204" pitchFamily="18" charset="0"/>
-            </a:endParaRPr>
-          </a:p>
-        </p:txBody>
-      </p:sp>
-      <p:sp>
-        <p:nvSpPr>
-          <p:cNvPr id="4" name="TextBox 3"/>
+              <a:rPr lang="en-US" sz="6000" dirty="0" smtClean="0"/>
+              <a:t>Razor Syntax</a:t>
+            </a:r>
+            <a:endParaRPr lang="en-US" sz="6000" dirty="0"/>
+          </a:p>
+        </p:txBody>
+      </p:sp>
+      <p:sp>
+        <p:nvSpPr>
+          <p:cNvPr id="5" name="TextBox 4"/>
           <p:cNvSpPr txBox="1"/>
           <p:nvPr/>
         </p:nvSpPr>
         <p:spPr>
           <a:xfrm>
-            <a:off x="6953956" y="5249332"/>
-            <a:ext cx="2320046" cy="369332"/>
+            <a:off x="7406641" y="5353986"/>
+            <a:ext cx="2298436" cy="369332"/>
           </a:xfrm>
           <a:prstGeom prst="rect">
             <a:avLst/>
@@ -7919,64 +9234,36 @@
                     <a:lumOff val="5000"/>
                   </a:schemeClr>
                 </a:solidFill>
-                <a:latin typeface="Cambria" panose="02040503050406030204" pitchFamily="18" charset="0"/>
+                <a:latin typeface="Times New Roman" panose="02020603050405020304" pitchFamily="18" charset="0"/>
                 <a:ea typeface="Cambria" panose="02040503050406030204" pitchFamily="18" charset="0"/>
-              </a:rPr>
-              <a:t>Sai </a:t>
-            </a:r>
-            <a:r>
-              <a:rPr lang="en-US" dirty="0" err="1">
-                <a:solidFill>
-                  <a:schemeClr val="tx1">
-                    <a:lumMod val="95000"/>
-                    <a:lumOff val="5000"/>
-                  </a:schemeClr>
-                </a:solidFill>
-                <a:latin typeface="Cambria" panose="02040503050406030204" pitchFamily="18" charset="0"/>
-                <a:ea typeface="Cambria" panose="02040503050406030204" pitchFamily="18" charset="0"/>
-              </a:rPr>
-              <a:t>Tejaswini</a:t>
-            </a:r>
-            <a:r>
-              <a:rPr lang="en-US" dirty="0">
-                <a:solidFill>
-                  <a:schemeClr val="tx1">
-                    <a:lumMod val="95000"/>
-                    <a:lumOff val="5000"/>
-                  </a:schemeClr>
-                </a:solidFill>
-                <a:latin typeface="Cambria" panose="02040503050406030204" pitchFamily="18" charset="0"/>
-                <a:ea typeface="Cambria" panose="02040503050406030204" pitchFamily="18" charset="0"/>
-              </a:rPr>
-              <a:t> </a:t>
-            </a:r>
-            <a:r>
-              <a:rPr lang="en-US" dirty="0" err="1">
-                <a:solidFill>
-                  <a:schemeClr val="tx1">
-                    <a:lumMod val="95000"/>
-                    <a:lumOff val="5000"/>
-                  </a:schemeClr>
-                </a:solidFill>
-                <a:latin typeface="Cambria" panose="02040503050406030204" pitchFamily="18" charset="0"/>
-                <a:ea typeface="Cambria" panose="02040503050406030204" pitchFamily="18" charset="0"/>
-              </a:rPr>
-              <a:t>Narne</a:t>
-            </a:r>
-            <a:endParaRPr lang="en-US" dirty="0"/>
+                <a:cs typeface="Times New Roman" panose="02020603050405020304" pitchFamily="18" charset="0"/>
+              </a:rPr>
+              <a:t>Sai Tejaswini Narne</a:t>
+            </a:r>
+            <a:endParaRPr lang="en-US" dirty="0">
+              <a:latin typeface="Times New Roman" panose="02020603050405020304" pitchFamily="18" charset="0"/>
+              <a:cs typeface="Times New Roman" panose="02020603050405020304" pitchFamily="18" charset="0"/>
+            </a:endParaRPr>
           </a:p>
         </p:txBody>
       </p:sp>
     </p:spTree>
     <p:extLst>
       <p:ext uri="{BB962C8B-B14F-4D97-AF65-F5344CB8AC3E}">
-        <p14:creationId xmlns:p14="http://schemas.microsoft.com/office/powerpoint/2010/main" val="627571273"/>
+        <p14:creationId xmlns:p14="http://schemas.microsoft.com/office/powerpoint/2010/main" val="3308372335"/>
       </p:ext>
     </p:extLst>
   </p:cSld>
   <p:clrMapOvr>
     <a:masterClrMapping/>
   </p:clrMapOvr>
+  <p:timing>
+    <p:tnLst>
+      <p:par>
+        <p:cTn id="1" dur="indefinite" restart="never" nodeType="tmRoot"/>
+      </p:par>
+    </p:tnLst>
+  </p:timing>
 </p:sld>
 </file>
 
@@ -7999,267 +9286,145 @@
       </p:grpSpPr>
       <p:sp>
         <p:nvSpPr>
-          <p:cNvPr id="3" name="Content Placeholder 2"/>
-          <p:cNvSpPr>
-            <a:spLocks noGrp="1"/>
-          </p:cNvSpPr>
-          <p:nvPr>
-            <p:ph idx="1"/>
+          <p:cNvPr id="2" name="Title 1"/>
+          <p:cNvSpPr>
+            <a:spLocks noGrp="1"/>
+          </p:cNvSpPr>
+          <p:nvPr>
+            <p:ph type="title"/>
           </p:nvPr>
         </p:nvSpPr>
         <p:spPr>
           <a:xfrm>
-            <a:off x="1164771" y="898161"/>
-            <a:ext cx="10515600" cy="4351338"/>
+            <a:off x="677334" y="718456"/>
+            <a:ext cx="8596668" cy="1055189"/>
           </a:xfrm>
         </p:spPr>
         <p:txBody>
-          <a:bodyPr>
-            <a:noAutofit/>
-          </a:bodyPr>
-          <a:lstStyle/>
-          <a:p>
-            <a:pPr marL="0" indent="0">
-              <a:buNone/>
-            </a:pPr>
-            <a:r>
-              <a:rPr lang="en-US" sz="1200" dirty="0" smtClean="0"/>
-              <a:t>@</a:t>
-            </a:r>
-            <a:r>
-              <a:rPr lang="en-US" sz="1200" dirty="0" err="1" smtClean="0"/>
-              <a:t>foreach</a:t>
-            </a:r>
-            <a:r>
-              <a:rPr lang="en-US" sz="1200" dirty="0" smtClean="0"/>
-              <a:t> (var item in Model) {</a:t>
-            </a:r>
-          </a:p>
-          <a:p>
-            <a:pPr marL="0" indent="0">
-              <a:buNone/>
-            </a:pPr>
-            <a:r>
-              <a:rPr lang="en-US" sz="1200" dirty="0" smtClean="0"/>
-              <a:t>   &lt;</a:t>
-            </a:r>
-            <a:r>
-              <a:rPr lang="en-US" sz="1200" dirty="0" err="1" smtClean="0"/>
-              <a:t>tr</a:t>
-            </a:r>
-            <a:r>
-              <a:rPr lang="en-US" sz="1200" dirty="0" smtClean="0"/>
-              <a:t>&gt;</a:t>
-            </a:r>
-          </a:p>
-          <a:p>
-            <a:pPr marL="0" indent="0">
-              <a:buNone/>
-            </a:pPr>
-            <a:r>
-              <a:rPr lang="en-US" sz="1200" dirty="0" smtClean="0"/>
-              <a:t>      &lt;td&gt;</a:t>
-            </a:r>
-          </a:p>
-          <a:p>
-            <a:pPr marL="0" indent="0">
-              <a:buNone/>
-            </a:pPr>
-            <a:r>
-              <a:rPr lang="en-US" sz="1200" dirty="0" smtClean="0"/>
-              <a:t>         @</a:t>
-            </a:r>
-            <a:r>
-              <a:rPr lang="en-US" sz="1200" dirty="0" err="1" smtClean="0"/>
-              <a:t>Html.ActionLink</a:t>
-            </a:r>
-            <a:r>
-              <a:rPr lang="en-US" sz="1200" dirty="0" smtClean="0"/>
-              <a:t>("Edit", "Edit", new { id = item.ID }) |</a:t>
-            </a:r>
-          </a:p>
-          <a:p>
-            <a:pPr marL="0" indent="0">
-              <a:buNone/>
-            </a:pPr>
-            <a:r>
-              <a:rPr lang="en-US" sz="1200" dirty="0" smtClean="0"/>
-              <a:t>         @</a:t>
-            </a:r>
-            <a:r>
-              <a:rPr lang="en-US" sz="1200" dirty="0" err="1" smtClean="0"/>
-              <a:t>Html.ActionLink</a:t>
-            </a:r>
-            <a:r>
-              <a:rPr lang="en-US" sz="1200" dirty="0" smtClean="0"/>
-              <a:t>("Details", "Details", new { id = item.ID }) |</a:t>
-            </a:r>
-          </a:p>
-          <a:p>
-            <a:pPr marL="0" indent="0">
-              <a:buNone/>
-            </a:pPr>
-            <a:r>
-              <a:rPr lang="en-US" sz="1200" dirty="0" smtClean="0"/>
-              <a:t>         @</a:t>
-            </a:r>
-            <a:r>
-              <a:rPr lang="en-US" sz="1200" dirty="0" err="1" smtClean="0"/>
-              <a:t>Html.ActionLink</a:t>
-            </a:r>
-            <a:r>
-              <a:rPr lang="en-US" sz="1200" dirty="0" smtClean="0"/>
-              <a:t>("Delete", "Delete", new { id = item.ID })</a:t>
-            </a:r>
-          </a:p>
-          <a:p>
-            <a:pPr marL="0" indent="0">
-              <a:buNone/>
-            </a:pPr>
-            <a:r>
-              <a:rPr lang="en-US" sz="1200" dirty="0" smtClean="0"/>
-              <a:t>      &lt;/td&gt;</a:t>
-            </a:r>
-          </a:p>
-          <a:p>
-            <a:pPr marL="0" indent="0">
-              <a:buNone/>
-            </a:pPr>
-            <a:r>
-              <a:rPr lang="en-US" sz="1200" dirty="0" smtClean="0"/>
-              <a:t>		</a:t>
-            </a:r>
-          </a:p>
-          <a:p>
-            <a:pPr marL="0" indent="0">
-              <a:buNone/>
-            </a:pPr>
-            <a:r>
-              <a:rPr lang="en-US" sz="1200" dirty="0" smtClean="0"/>
-              <a:t>      &lt;td&gt;</a:t>
-            </a:r>
-          </a:p>
-          <a:p>
-            <a:pPr marL="0" indent="0">
-              <a:buNone/>
-            </a:pPr>
-            <a:r>
-              <a:rPr lang="en-US" sz="1200" dirty="0" smtClean="0"/>
-              <a:t>         @</a:t>
-            </a:r>
-            <a:r>
-              <a:rPr lang="en-US" sz="1200" dirty="0" err="1" smtClean="0"/>
-              <a:t>item.Name</a:t>
-            </a:r>
-            <a:endParaRPr lang="en-US" sz="1200" dirty="0" smtClean="0"/>
-          </a:p>
-          <a:p>
-            <a:pPr marL="0" indent="0">
-              <a:buNone/>
-            </a:pPr>
-            <a:r>
-              <a:rPr lang="en-US" sz="1200" dirty="0" smtClean="0"/>
-              <a:t>      &lt;/td&gt;</a:t>
-            </a:r>
-          </a:p>
-          <a:p>
-            <a:pPr marL="0" indent="0">
-              <a:buNone/>
-            </a:pPr>
-            <a:r>
-              <a:rPr lang="en-US" sz="1200" dirty="0" smtClean="0"/>
-              <a:t>		</a:t>
-            </a:r>
-          </a:p>
-          <a:p>
-            <a:pPr marL="0" indent="0">
-              <a:buNone/>
-            </a:pPr>
-            <a:r>
-              <a:rPr lang="en-US" sz="1200" dirty="0" smtClean="0"/>
-              <a:t>      &lt;td&gt;</a:t>
-            </a:r>
-          </a:p>
-          <a:p>
-            <a:pPr marL="0" indent="0">
-              <a:buNone/>
-            </a:pPr>
-            <a:r>
-              <a:rPr lang="en-US" sz="1200" dirty="0" smtClean="0"/>
-              <a:t>         @</a:t>
-            </a:r>
-            <a:r>
-              <a:rPr lang="en-US" sz="1200" dirty="0" err="1" smtClean="0"/>
-              <a:t>String.Format</a:t>
-            </a:r>
-            <a:r>
-              <a:rPr lang="en-US" sz="1200" dirty="0" smtClean="0"/>
-              <a:t>("{0,g}", </a:t>
-            </a:r>
-            <a:r>
-              <a:rPr lang="en-US" sz="1200" dirty="0" err="1" smtClean="0"/>
-              <a:t>item.JoiningDate</a:t>
-            </a:r>
-            <a:r>
-              <a:rPr lang="en-US" sz="1200" dirty="0" smtClean="0"/>
-              <a:t>)</a:t>
-            </a:r>
-          </a:p>
-          <a:p>
-            <a:pPr marL="0" indent="0">
-              <a:buNone/>
-            </a:pPr>
-            <a:r>
-              <a:rPr lang="en-US" sz="1200" dirty="0" smtClean="0"/>
-              <a:t>      &lt;/td&gt;</a:t>
-            </a:r>
-          </a:p>
-          <a:p>
-            <a:pPr marL="0" indent="0">
-              <a:buNone/>
-            </a:pPr>
-            <a:r>
-              <a:rPr lang="en-US" sz="1200" dirty="0" smtClean="0"/>
-              <a:t>   &lt;/</a:t>
-            </a:r>
-            <a:r>
-              <a:rPr lang="en-US" sz="1200" dirty="0" err="1" smtClean="0"/>
-              <a:t>tr</a:t>
-            </a:r>
-            <a:r>
-              <a:rPr lang="en-US" sz="1200" dirty="0" smtClean="0"/>
-              <a:t>&gt;</a:t>
-            </a:r>
-          </a:p>
-          <a:p>
-            <a:pPr marL="0" indent="0">
-              <a:buNone/>
-            </a:pPr>
-            <a:r>
-              <a:rPr lang="en-US" sz="1200" dirty="0" smtClean="0"/>
-              <a:t>}</a:t>
-            </a:r>
-            <a:endParaRPr lang="en-US" sz="1200" dirty="0"/>
-          </a:p>
-        </p:txBody>
-      </p:sp>
-      <p:sp>
-        <p:nvSpPr>
-          <p:cNvPr id="2" name="Rectangle 1"/>
-          <p:cNvSpPr/>
-          <p:nvPr/>
+          <a:bodyPr/>
+          <a:lstStyle/>
+          <a:p>
+            <a:r>
+              <a:rPr lang="en-US" dirty="0" smtClean="0"/>
+              <a:t>Razor Syntax</a:t>
+            </a:r>
+            <a:endParaRPr lang="en-US" dirty="0"/>
+          </a:p>
+        </p:txBody>
+      </p:sp>
+      <p:sp>
+        <p:nvSpPr>
+          <p:cNvPr id="3" name="Content Placeholder 2"/>
+          <p:cNvSpPr>
+            <a:spLocks noGrp="1"/>
+          </p:cNvSpPr>
+          <p:nvPr>
+            <p:ph idx="1"/>
+          </p:nvPr>
         </p:nvSpPr>
         <p:spPr>
           <a:xfrm>
-            <a:off x="6537196" y="5795623"/>
-            <a:ext cx="2120452" cy="369332"/>
+            <a:off x="677334" y="1773645"/>
+            <a:ext cx="8596668" cy="4267717"/>
+          </a:xfrm>
+        </p:spPr>
+        <p:txBody>
+          <a:bodyPr/>
+          <a:lstStyle/>
+          <a:p>
+            <a:r>
+              <a:rPr lang="en-US" dirty="0">
+                <a:latin typeface="Times New Roman" panose="02020603050405020304" pitchFamily="18" charset="0"/>
+                <a:cs typeface="Times New Roman" panose="02020603050405020304" pitchFamily="18" charset="0"/>
+              </a:rPr>
+              <a:t>Razor code blocks are enclosed in @{ ... }</a:t>
+            </a:r>
+          </a:p>
+          <a:p>
+            <a:r>
+              <a:rPr lang="en-US" dirty="0">
+                <a:latin typeface="Times New Roman" panose="02020603050405020304" pitchFamily="18" charset="0"/>
+                <a:cs typeface="Times New Roman" panose="02020603050405020304" pitchFamily="18" charset="0"/>
+              </a:rPr>
+              <a:t>Inline expressions (variables and functions) start with @</a:t>
+            </a:r>
+          </a:p>
+          <a:p>
+            <a:r>
+              <a:rPr lang="en-US" dirty="0">
+                <a:latin typeface="Times New Roman" panose="02020603050405020304" pitchFamily="18" charset="0"/>
+                <a:cs typeface="Times New Roman" panose="02020603050405020304" pitchFamily="18" charset="0"/>
+              </a:rPr>
+              <a:t>Code statements end with semicolon</a:t>
+            </a:r>
+          </a:p>
+          <a:p>
+            <a:r>
+              <a:rPr lang="en-US" dirty="0">
+                <a:latin typeface="Times New Roman" panose="02020603050405020304" pitchFamily="18" charset="0"/>
+                <a:cs typeface="Times New Roman" panose="02020603050405020304" pitchFamily="18" charset="0"/>
+              </a:rPr>
+              <a:t>Variables are declared with the var keyword</a:t>
+            </a:r>
+          </a:p>
+          <a:p>
+            <a:r>
+              <a:rPr lang="en-US" dirty="0">
+                <a:latin typeface="Times New Roman" panose="02020603050405020304" pitchFamily="18" charset="0"/>
+                <a:cs typeface="Times New Roman" panose="02020603050405020304" pitchFamily="18" charset="0"/>
+              </a:rPr>
+              <a:t>Strings are enclosed with quotation marks</a:t>
+            </a:r>
+          </a:p>
+          <a:p>
+            <a:r>
+              <a:rPr lang="en-US" dirty="0">
+                <a:latin typeface="Times New Roman" panose="02020603050405020304" pitchFamily="18" charset="0"/>
+                <a:cs typeface="Times New Roman" panose="02020603050405020304" pitchFamily="18" charset="0"/>
+              </a:rPr>
+              <a:t>C# code is case sensitive</a:t>
+            </a:r>
+          </a:p>
+          <a:p>
+            <a:r>
+              <a:rPr lang="en-US" dirty="0">
+                <a:latin typeface="Times New Roman" panose="02020603050405020304" pitchFamily="18" charset="0"/>
+                <a:cs typeface="Times New Roman" panose="02020603050405020304" pitchFamily="18" charset="0"/>
+              </a:rPr>
+              <a:t>C# files have the extension .</a:t>
+            </a:r>
+            <a:r>
+              <a:rPr lang="en-US" dirty="0" smtClean="0">
+                <a:latin typeface="Times New Roman" panose="02020603050405020304" pitchFamily="18" charset="0"/>
+                <a:cs typeface="Times New Roman" panose="02020603050405020304" pitchFamily="18" charset="0"/>
+              </a:rPr>
+              <a:t>cshtml</a:t>
+            </a:r>
+            <a:endParaRPr lang="en-US" dirty="0">
+              <a:latin typeface="Times New Roman" panose="02020603050405020304" pitchFamily="18" charset="0"/>
+              <a:cs typeface="Times New Roman" panose="02020603050405020304" pitchFamily="18" charset="0"/>
+            </a:endParaRPr>
+          </a:p>
+        </p:txBody>
+      </p:sp>
+      <p:sp>
+        <p:nvSpPr>
+          <p:cNvPr id="5" name="TextBox 4"/>
+          <p:cNvSpPr txBox="1"/>
+          <p:nvPr/>
+        </p:nvSpPr>
+        <p:spPr>
+          <a:xfrm>
+            <a:off x="7406641" y="5353986"/>
+            <a:ext cx="2298436" cy="369332"/>
           </a:xfrm>
           <a:prstGeom prst="rect">
             <a:avLst/>
           </a:prstGeom>
+          <a:noFill/>
         </p:spPr>
         <p:txBody>
-          <a:bodyPr wrap="none">
+          <a:bodyPr wrap="square" rtlCol="0">
             <a:spAutoFit/>
           </a:bodyPr>
           <a:lstStyle/>
@@ -8272,64 +9437,36 @@
                     <a:lumOff val="5000"/>
                   </a:schemeClr>
                 </a:solidFill>
-                <a:latin typeface="Cambria" panose="02040503050406030204" pitchFamily="18" charset="0"/>
+                <a:latin typeface="Times New Roman" panose="02020603050405020304" pitchFamily="18" charset="0"/>
                 <a:ea typeface="Cambria" panose="02040503050406030204" pitchFamily="18" charset="0"/>
-              </a:rPr>
-              <a:t>Sai </a:t>
-            </a:r>
-            <a:r>
-              <a:rPr lang="en-US" dirty="0" err="1">
-                <a:solidFill>
-                  <a:schemeClr val="tx1">
-                    <a:lumMod val="95000"/>
-                    <a:lumOff val="5000"/>
-                  </a:schemeClr>
-                </a:solidFill>
-                <a:latin typeface="Cambria" panose="02040503050406030204" pitchFamily="18" charset="0"/>
-                <a:ea typeface="Cambria" panose="02040503050406030204" pitchFamily="18" charset="0"/>
-              </a:rPr>
-              <a:t>Tejaswini</a:t>
-            </a:r>
-            <a:r>
-              <a:rPr lang="en-US" dirty="0">
-                <a:solidFill>
-                  <a:schemeClr val="tx1">
-                    <a:lumMod val="95000"/>
-                    <a:lumOff val="5000"/>
-                  </a:schemeClr>
-                </a:solidFill>
-                <a:latin typeface="Cambria" panose="02040503050406030204" pitchFamily="18" charset="0"/>
-                <a:ea typeface="Cambria" panose="02040503050406030204" pitchFamily="18" charset="0"/>
-              </a:rPr>
-              <a:t> </a:t>
-            </a:r>
-            <a:r>
-              <a:rPr lang="en-US" dirty="0" err="1">
-                <a:solidFill>
-                  <a:schemeClr val="tx1">
-                    <a:lumMod val="95000"/>
-                    <a:lumOff val="5000"/>
-                  </a:schemeClr>
-                </a:solidFill>
-                <a:latin typeface="Cambria" panose="02040503050406030204" pitchFamily="18" charset="0"/>
-                <a:ea typeface="Cambria" panose="02040503050406030204" pitchFamily="18" charset="0"/>
-              </a:rPr>
-              <a:t>Narne</a:t>
-            </a:r>
-            <a:endParaRPr lang="en-US" dirty="0"/>
+                <a:cs typeface="Times New Roman" panose="02020603050405020304" pitchFamily="18" charset="0"/>
+              </a:rPr>
+              <a:t>Sai Tejaswini Narne</a:t>
+            </a:r>
+            <a:endParaRPr lang="en-US" dirty="0">
+              <a:latin typeface="Times New Roman" panose="02020603050405020304" pitchFamily="18" charset="0"/>
+              <a:cs typeface="Times New Roman" panose="02020603050405020304" pitchFamily="18" charset="0"/>
+            </a:endParaRPr>
           </a:p>
         </p:txBody>
       </p:sp>
     </p:spTree>
     <p:extLst>
       <p:ext uri="{BB962C8B-B14F-4D97-AF65-F5344CB8AC3E}">
-        <p14:creationId xmlns:p14="http://schemas.microsoft.com/office/powerpoint/2010/main" val="1708442171"/>
+        <p14:creationId xmlns:p14="http://schemas.microsoft.com/office/powerpoint/2010/main" val="3142503162"/>
       </p:ext>
     </p:extLst>
   </p:cSld>
   <p:clrMapOvr>
     <a:masterClrMapping/>
   </p:clrMapOvr>
+  <p:timing>
+    <p:tnLst>
+      <p:par>
+        <p:cTn id="1" dur="indefinite" restart="never" nodeType="tmRoot"/>
+      </p:par>
+    </p:tnLst>
+  </p:timing>
 </p:sld>
 </file>
 

</xml_diff>

<commit_message>
commit changes in README.md
</commit_message>
<xml_diff>
--- a/Razor views.pptx
+++ b/Razor views.pptx
@@ -5929,44 +5929,8 @@
                 <a:latin typeface="Cambria" panose="02040503050406030204" pitchFamily="18" charset="0"/>
                 <a:ea typeface="Cambria" panose="02040503050406030204" pitchFamily="18" charset="0"/>
               </a:rPr>
-              <a:t>Team </a:t>
-            </a:r>
-            <a:r>
-              <a:rPr lang="en-US" sz="2400" dirty="0" smtClean="0">
-                <a:solidFill>
-                  <a:schemeClr val="tx1">
-                    <a:lumMod val="95000"/>
-                    <a:lumOff val="5000"/>
-                  </a:schemeClr>
-                </a:solidFill>
-                <a:latin typeface="Cambria" panose="02040503050406030204" pitchFamily="18" charset="0"/>
-                <a:ea typeface="Cambria" panose="02040503050406030204" pitchFamily="18" charset="0"/>
-              </a:rPr>
-              <a:t>Members</a:t>
-            </a:r>
-            <a:r>
-              <a:rPr lang="en-US" sz="2400" dirty="0" smtClean="0">
-                <a:solidFill>
-                  <a:schemeClr val="tx1">
-                    <a:lumMod val="95000"/>
-                    <a:lumOff val="5000"/>
-                  </a:schemeClr>
-                </a:solidFill>
-                <a:latin typeface="Cambria" panose="02040503050406030204" pitchFamily="18" charset="0"/>
-                <a:ea typeface="Cambria" panose="02040503050406030204" pitchFamily="18" charset="0"/>
-              </a:rPr>
-              <a:t>:</a:t>
-            </a:r>
-            <a:endParaRPr lang="en-US" sz="2400" dirty="0" smtClean="0">
-              <a:solidFill>
-                <a:schemeClr val="tx1">
-                  <a:lumMod val="95000"/>
-                  <a:lumOff val="5000"/>
-                </a:schemeClr>
-              </a:solidFill>
-              <a:latin typeface="Cambria" panose="02040503050406030204" pitchFamily="18" charset="0"/>
-              <a:ea typeface="Cambria" panose="02040503050406030204" pitchFamily="18" charset="0"/>
-            </a:endParaRPr>
+              <a:t>Team Members:</a:t>
+            </a:r>
           </a:p>
           <a:p>
             <a:pPr algn="l"/>
@@ -6608,8 +6572,33 @@
                 <a:latin typeface="Times New Roman" panose="02020603050405020304" pitchFamily="18" charset="0"/>
                 <a:cs typeface="Times New Roman" panose="02020603050405020304" pitchFamily="18" charset="0"/>
               </a:rPr>
-              <a:t>The greeting is: Welcome to our site! Here in Maryville it is: Tuesday</a:t>
-            </a:r>
+              <a:t>The greeting is: Welcome to our site! Here in Maryville it is</a:t>
+            </a:r>
+            <a:r>
+              <a:rPr lang="en-US">
+                <a:latin typeface="Times New Roman" panose="02020603050405020304" pitchFamily="18" charset="0"/>
+                <a:cs typeface="Times New Roman" panose="02020603050405020304" pitchFamily="18" charset="0"/>
+              </a:rPr>
+              <a:t>: </a:t>
+            </a:r>
+            <a:r>
+              <a:rPr lang="en-US" smtClean="0">
+                <a:latin typeface="Times New Roman" panose="02020603050405020304" pitchFamily="18" charset="0"/>
+                <a:cs typeface="Times New Roman" panose="02020603050405020304" pitchFamily="18" charset="0"/>
+              </a:rPr>
+              <a:t>Wednes</a:t>
+            </a:r>
+            <a:r>
+              <a:rPr lang="en-US" smtClean="0">
+                <a:latin typeface="Times New Roman" panose="02020603050405020304" pitchFamily="18" charset="0"/>
+                <a:cs typeface="Times New Roman" panose="02020603050405020304" pitchFamily="18" charset="0"/>
+              </a:rPr>
+              <a:t>day</a:t>
+            </a:r>
+            <a:endParaRPr lang="en-US" dirty="0">
+              <a:latin typeface="Times New Roman" panose="02020603050405020304" pitchFamily="18" charset="0"/>
+              <a:cs typeface="Times New Roman" panose="02020603050405020304" pitchFamily="18" charset="0"/>
+            </a:endParaRPr>
           </a:p>
           <a:p>
             <a:endParaRPr lang="en-US" dirty="0">

</xml_diff>

<commit_message>
changes in my slides
</commit_message>
<xml_diff>
--- a/Razor views.pptx
+++ b/Razor views.pptx
@@ -8701,12 +8701,8 @@
               <a:t>1. </a:t>
             </a:r>
             <a:r>
-              <a:rPr lang="en-US" sz="2400" dirty="0" err="1" smtClean="0"/>
-              <a:t>Implict</a:t>
-            </a:r>
-            <a:r>
               <a:rPr lang="en-US" sz="2400" dirty="0" smtClean="0"/>
-              <a:t> </a:t>
+              <a:t>Implicit </a:t>
             </a:r>
             <a:r>
               <a:rPr lang="en-US" sz="2400" dirty="0" smtClean="0"/>
@@ -8778,12 +8774,12 @@
               <a:t>2. </a:t>
             </a:r>
             <a:r>
-              <a:rPr lang="en-US" sz="2400" dirty="0" err="1" smtClean="0"/>
-              <a:t>Explict</a:t>
+              <a:rPr lang="en-US" sz="2400" smtClean="0"/>
+              <a:t>Explicit </a:t>
             </a:r>
             <a:r>
               <a:rPr lang="en-US" sz="2400" dirty="0" smtClean="0"/>
-              <a:t> Razor Expression.</a:t>
+              <a:t>Razor Expression.</a:t>
             </a:r>
           </a:p>
           <a:p>

</xml_diff>

<commit_message>
commited changes with ppt slides
</commit_message>
<xml_diff>
--- a/Razor views.pptx
+++ b/Razor views.pptx
@@ -5,7 +5,7 @@
     <p:sldMasterId id="2147483660" r:id="rId1"/>
   </p:sldMasterIdLst>
   <p:sldIdLst>
-    <p:sldId id="256" r:id="rId2"/>
+    <p:sldId id="276" r:id="rId2"/>
     <p:sldId id="259" r:id="rId3"/>
     <p:sldId id="257" r:id="rId4"/>
     <p:sldId id="262" r:id="rId5"/>
@@ -23,6 +23,7 @@
     <p:sldId id="275" r:id="rId17"/>
     <p:sldId id="266" r:id="rId18"/>
     <p:sldId id="265" r:id="rId19"/>
+    <p:sldId id="277" r:id="rId20"/>
   </p:sldIdLst>
   <p:sldSz cx="12192000" cy="6858000"/>
   <p:notesSz cx="6858000" cy="9144000"/>
@@ -5832,11 +5833,6 @@
 <file path=ppt/slides/slide1.xml><?xml version="1.0" encoding="utf-8"?>
 <p:sld xmlns:a="http://schemas.openxmlformats.org/drawingml/2006/main" xmlns:r="http://schemas.openxmlformats.org/officeDocument/2006/relationships" xmlns:p="http://schemas.openxmlformats.org/presentationml/2006/main">
   <p:cSld>
-    <p:bg>
-      <p:bgRef idx="1001">
-        <a:schemeClr val="bg1"/>
-      </p:bgRef>
-    </p:bg>
     <p:spTree>
       <p:nvGrpSpPr>
         <p:cNvPr id="1" name=""/>
@@ -6115,23 +6111,57 @@
           </a:prstGeom>
         </p:spPr>
       </p:pic>
+      <p:pic>
+        <p:nvPicPr>
+          <p:cNvPr id="1026" name="Picture 2" descr="https://avatars0.githubusercontent.com/u/43020059?s=400&amp;v=4"/>
+          <p:cNvPicPr>
+            <a:picLocks noChangeAspect="1" noChangeArrowheads="1"/>
+          </p:cNvPicPr>
+          <p:nvPr/>
+        </p:nvPicPr>
+        <p:blipFill>
+          <a:blip r:embed="rId4">
+            <a:extLst>
+              <a:ext uri="{28A0092B-C50C-407E-A947-70E740481C1C}">
+                <a14:useLocalDpi xmlns:a14="http://schemas.microsoft.com/office/drawing/2010/main" val="0"/>
+              </a:ext>
+            </a:extLst>
+          </a:blip>
+          <a:srcRect/>
+          <a:stretch>
+            <a:fillRect/>
+          </a:stretch>
+        </p:blipFill>
+        <p:spPr bwMode="auto">
+          <a:xfrm>
+            <a:off x="7171509" y="3879669"/>
+            <a:ext cx="2009865" cy="2009866"/>
+          </a:xfrm>
+          <a:prstGeom prst="rect">
+            <a:avLst/>
+          </a:prstGeom>
+          <a:noFill/>
+          <a:extLst>
+            <a:ext uri="{909E8E84-426E-40DD-AFC4-6F175D3DCCD1}">
+              <a14:hiddenFill xmlns:a14="http://schemas.microsoft.com/office/drawing/2010/main">
+                <a:solidFill>
+                  <a:srgbClr val="FFFFFF"/>
+                </a:solidFill>
+              </a14:hiddenFill>
+            </a:ext>
+          </a:extLst>
+        </p:spPr>
+      </p:pic>
     </p:spTree>
     <p:extLst>
       <p:ext uri="{BB962C8B-B14F-4D97-AF65-F5344CB8AC3E}">
-        <p14:creationId xmlns:p14="http://schemas.microsoft.com/office/powerpoint/2010/main" val="2254873060"/>
+        <p14:creationId xmlns:p14="http://schemas.microsoft.com/office/powerpoint/2010/main" val="2754885011"/>
       </p:ext>
     </p:extLst>
   </p:cSld>
   <p:clrMapOvr>
-    <a:overrideClrMapping bg1="lt1" tx1="dk1" bg2="lt2" tx2="dk2" accent1="accent1" accent2="accent2" accent3="accent3" accent4="accent4" accent5="accent5" accent6="accent6" hlink="hlink" folHlink="folHlink"/>
+    <a:masterClrMapping/>
   </p:clrMapOvr>
-  <p:timing>
-    <p:tnLst>
-      <p:par>
-        <p:cTn id="1" dur="indefinite" restart="never" nodeType="tmRoot"/>
-      </p:par>
-    </p:tnLst>
-  </p:timing>
 </p:sld>
 </file>
 
@@ -7802,6 +7832,96 @@
 </p:sld>
 </file>
 
+<file path=ppt/slides/slide19.xml><?xml version="1.0" encoding="utf-8"?>
+<p:sld xmlns:a="http://schemas.openxmlformats.org/drawingml/2006/main" xmlns:r="http://schemas.openxmlformats.org/officeDocument/2006/relationships" xmlns:p="http://schemas.openxmlformats.org/presentationml/2006/main">
+  <p:cSld>
+    <p:spTree>
+      <p:nvGrpSpPr>
+        <p:cNvPr id="1" name=""/>
+        <p:cNvGrpSpPr/>
+        <p:nvPr/>
+      </p:nvGrpSpPr>
+      <p:grpSpPr>
+        <a:xfrm>
+          <a:off x="0" y="0"/>
+          <a:ext cx="0" cy="0"/>
+          <a:chOff x="0" y="0"/>
+          <a:chExt cx="0" cy="0"/>
+        </a:xfrm>
+      </p:grpSpPr>
+      <p:sp>
+        <p:nvSpPr>
+          <p:cNvPr id="3" name="Content Placeholder 2"/>
+          <p:cNvSpPr>
+            <a:spLocks noGrp="1"/>
+          </p:cNvSpPr>
+          <p:nvPr>
+            <p:ph idx="1"/>
+          </p:nvPr>
+        </p:nvSpPr>
+        <p:spPr/>
+        <p:txBody>
+          <a:bodyPr/>
+          <a:lstStyle/>
+          <a:p>
+            <a:endParaRPr lang="en-US" dirty="0"/>
+          </a:p>
+        </p:txBody>
+      </p:sp>
+      <p:pic>
+        <p:nvPicPr>
+          <p:cNvPr id="2050" name="Picture 2" descr="Image result for any questions images"/>
+          <p:cNvPicPr>
+            <a:picLocks noChangeAspect="1" noChangeArrowheads="1"/>
+          </p:cNvPicPr>
+          <p:nvPr/>
+        </p:nvPicPr>
+        <p:blipFill>
+          <a:blip r:embed="rId2">
+            <a:extLst>
+              <a:ext uri="{28A0092B-C50C-407E-A947-70E740481C1C}">
+                <a14:useLocalDpi xmlns:a14="http://schemas.microsoft.com/office/drawing/2010/main" val="0"/>
+              </a:ext>
+            </a:extLst>
+          </a:blip>
+          <a:srcRect/>
+          <a:stretch>
+            <a:fillRect/>
+          </a:stretch>
+        </p:blipFill>
+        <p:spPr bwMode="auto">
+          <a:xfrm>
+            <a:off x="677334" y="574766"/>
+            <a:ext cx="8596668" cy="5871545"/>
+          </a:xfrm>
+          <a:prstGeom prst="rect">
+            <a:avLst/>
+          </a:prstGeom>
+          <a:noFill/>
+          <a:extLst>
+            <a:ext uri="{909E8E84-426E-40DD-AFC4-6F175D3DCCD1}">
+              <a14:hiddenFill xmlns:a14="http://schemas.microsoft.com/office/drawing/2010/main">
+                <a:solidFill>
+                  <a:srgbClr val="FFFFFF"/>
+                </a:solidFill>
+              </a14:hiddenFill>
+            </a:ext>
+          </a:extLst>
+        </p:spPr>
+      </p:pic>
+    </p:spTree>
+    <p:extLst>
+      <p:ext uri="{BB962C8B-B14F-4D97-AF65-F5344CB8AC3E}">
+        <p14:creationId xmlns:p14="http://schemas.microsoft.com/office/powerpoint/2010/main" val="181922108"/>
+      </p:ext>
+    </p:extLst>
+  </p:cSld>
+  <p:clrMapOvr>
+    <a:masterClrMapping/>
+  </p:clrMapOvr>
+</p:sld>
+</file>
+
 <file path=ppt/slides/slide2.xml><?xml version="1.0" encoding="utf-8"?>
 <p:sld xmlns:a="http://schemas.openxmlformats.org/drawingml/2006/main" xmlns:r="http://schemas.openxmlformats.org/officeDocument/2006/relationships" xmlns:p="http://schemas.openxmlformats.org/presentationml/2006/main">
   <p:cSld>
@@ -8698,15 +8818,7 @@
             </a:r>
             <a:r>
               <a:rPr lang="en-US" sz="2400" dirty="0" smtClean="0"/>
-              <a:t>1. </a:t>
-            </a:r>
-            <a:r>
-              <a:rPr lang="en-US" sz="2400" dirty="0" smtClean="0"/>
-              <a:t>Implicit </a:t>
-            </a:r>
-            <a:r>
-              <a:rPr lang="en-US" sz="2400" dirty="0" smtClean="0"/>
-              <a:t>Razor Expression.</a:t>
+              <a:t>1. Implicit Razor Expression.</a:t>
             </a:r>
           </a:p>
           <a:p>

</xml_diff>